<commit_message>
New bpm call (#40)
* new BPM env variables

* BPM bypass implementation

* BPM bypass documentation
</commit_message>
<xml_diff>
--- a/docs/itg-tests/containerAnomaly/container_anomaly_tests.pptx
+++ b/docs/itg-tests/containerAnomaly/container_anomaly_tests.pptx
@@ -7,12 +7,14 @@
   <p:sldIdLst>
     <p:sldId id="141168491" r:id="rId2"/>
     <p:sldId id="141168485" r:id="rId3"/>
-    <p:sldId id="141168486" r:id="rId4"/>
-    <p:sldId id="141168487" r:id="rId5"/>
-    <p:sldId id="141168488" r:id="rId6"/>
-    <p:sldId id="141168492" r:id="rId7"/>
-    <p:sldId id="141168493" r:id="rId8"/>
-    <p:sldId id="141168494" r:id="rId9"/>
+    <p:sldId id="141168495" r:id="rId4"/>
+    <p:sldId id="141168486" r:id="rId5"/>
+    <p:sldId id="141168487" r:id="rId6"/>
+    <p:sldId id="141168488" r:id="rId7"/>
+    <p:sldId id="141168492" r:id="rId8"/>
+    <p:sldId id="141168493" r:id="rId9"/>
+    <p:sldId id="141168494" r:id="rId10"/>
+    <p:sldId id="141168496" r:id="rId11"/>
   </p:sldIdLst>
   <p:sldSz cx="12192000" cy="6858000"/>
   <p:notesSz cx="6858000" cy="9144000"/>
@@ -268,7 +270,7 @@
           <a:p>
             <a:fld id="{198DD1AB-C11E-1747-BCCA-3C8476DF21EF}" type="datetimeFigureOut">
               <a:rPr lang="en-US" smtClean="0"/>
-              <a:t>12/19/19</a:t>
+              <a:t>1/10/20</a:t>
             </a:fld>
             <a:endParaRPr lang="en-US"/>
           </a:p>
@@ -468,7 +470,7 @@
           <a:p>
             <a:fld id="{198DD1AB-C11E-1747-BCCA-3C8476DF21EF}" type="datetimeFigureOut">
               <a:rPr lang="en-US" smtClean="0"/>
-              <a:t>12/19/19</a:t>
+              <a:t>1/10/20</a:t>
             </a:fld>
             <a:endParaRPr lang="en-US"/>
           </a:p>
@@ -678,7 +680,7 @@
           <a:p>
             <a:fld id="{198DD1AB-C11E-1747-BCCA-3C8476DF21EF}" type="datetimeFigureOut">
               <a:rPr lang="en-US" smtClean="0"/>
-              <a:t>12/19/19</a:t>
+              <a:t>1/10/20</a:t>
             </a:fld>
             <a:endParaRPr lang="en-US"/>
           </a:p>
@@ -878,7 +880,7 @@
           <a:p>
             <a:fld id="{198DD1AB-C11E-1747-BCCA-3C8476DF21EF}" type="datetimeFigureOut">
               <a:rPr lang="en-US" smtClean="0"/>
-              <a:t>12/19/19</a:t>
+              <a:t>1/10/20</a:t>
             </a:fld>
             <a:endParaRPr lang="en-US"/>
           </a:p>
@@ -1154,7 +1156,7 @@
           <a:p>
             <a:fld id="{198DD1AB-C11E-1747-BCCA-3C8476DF21EF}" type="datetimeFigureOut">
               <a:rPr lang="en-US" smtClean="0"/>
-              <a:t>12/19/19</a:t>
+              <a:t>1/10/20</a:t>
             </a:fld>
             <a:endParaRPr lang="en-US"/>
           </a:p>
@@ -1422,7 +1424,7 @@
           <a:p>
             <a:fld id="{198DD1AB-C11E-1747-BCCA-3C8476DF21EF}" type="datetimeFigureOut">
               <a:rPr lang="en-US" smtClean="0"/>
-              <a:t>12/19/19</a:t>
+              <a:t>1/10/20</a:t>
             </a:fld>
             <a:endParaRPr lang="en-US"/>
           </a:p>
@@ -1837,7 +1839,7 @@
           <a:p>
             <a:fld id="{198DD1AB-C11E-1747-BCCA-3C8476DF21EF}" type="datetimeFigureOut">
               <a:rPr lang="en-US" smtClean="0"/>
-              <a:t>12/19/19</a:t>
+              <a:t>1/10/20</a:t>
             </a:fld>
             <a:endParaRPr lang="en-US"/>
           </a:p>
@@ -1979,7 +1981,7 @@
           <a:p>
             <a:fld id="{198DD1AB-C11E-1747-BCCA-3C8476DF21EF}" type="datetimeFigureOut">
               <a:rPr lang="en-US" smtClean="0"/>
-              <a:t>12/19/19</a:t>
+              <a:t>1/10/20</a:t>
             </a:fld>
             <a:endParaRPr lang="en-US"/>
           </a:p>
@@ -2092,7 +2094,7 @@
           <a:p>
             <a:fld id="{198DD1AB-C11E-1747-BCCA-3C8476DF21EF}" type="datetimeFigureOut">
               <a:rPr lang="en-US" smtClean="0"/>
-              <a:t>12/19/19</a:t>
+              <a:t>1/10/20</a:t>
             </a:fld>
             <a:endParaRPr lang="en-US"/>
           </a:p>
@@ -2405,7 +2407,7 @@
           <a:p>
             <a:fld id="{198DD1AB-C11E-1747-BCCA-3C8476DF21EF}" type="datetimeFigureOut">
               <a:rPr lang="en-US" smtClean="0"/>
-              <a:t>12/19/19</a:t>
+              <a:t>1/10/20</a:t>
             </a:fld>
             <a:endParaRPr lang="en-US"/>
           </a:p>
@@ -2694,7 +2696,7 @@
           <a:p>
             <a:fld id="{198DD1AB-C11E-1747-BCCA-3C8476DF21EF}" type="datetimeFigureOut">
               <a:rPr lang="en-US" smtClean="0"/>
-              <a:t>12/19/19</a:t>
+              <a:t>1/10/20</a:t>
             </a:fld>
             <a:endParaRPr lang="en-US"/>
           </a:p>
@@ -2937,7 +2939,7 @@
           <a:p>
             <a:fld id="{198DD1AB-C11E-1747-BCCA-3C8476DF21EF}" type="datetimeFigureOut">
               <a:rPr lang="en-US" smtClean="0"/>
-              <a:t>12/19/19</a:t>
+              <a:t>1/10/20</a:t>
             </a:fld>
             <a:endParaRPr lang="en-US"/>
           </a:p>
@@ -4734,7 +4736,4256 @@
 </p:sld>
 </file>
 
+<file path=ppt/slides/slide10.xml><?xml version="1.0" encoding="utf-8"?>
+<p:sld xmlns:a="http://schemas.openxmlformats.org/drawingml/2006/main" xmlns:r="http://schemas.openxmlformats.org/officeDocument/2006/relationships" xmlns:p="http://schemas.openxmlformats.org/presentationml/2006/main">
+  <p:cSld>
+    <p:spTree>
+      <p:nvGrpSpPr>
+        <p:cNvPr id="1" name=""/>
+        <p:cNvGrpSpPr/>
+        <p:nvPr/>
+      </p:nvGrpSpPr>
+      <p:grpSpPr>
+        <a:xfrm>
+          <a:off x="0" y="0"/>
+          <a:ext cx="0" cy="0"/>
+          <a:chOff x="0" y="0"/>
+          <a:chExt cx="0" cy="0"/>
+        </a:xfrm>
+      </p:grpSpPr>
+      <p:sp>
+        <p:nvSpPr>
+          <p:cNvPr id="2" name="Title 1">
+            <a:extLst>
+              <a:ext uri="{FF2B5EF4-FFF2-40B4-BE49-F238E27FC236}">
+                <a16:creationId xmlns:a16="http://schemas.microsoft.com/office/drawing/2014/main" id="{C2DC263B-64E3-534F-883E-DA4B2E433FAC}"/>
+              </a:ext>
+            </a:extLst>
+          </p:cNvPr>
+          <p:cNvSpPr>
+            <a:spLocks noGrp="1"/>
+          </p:cNvSpPr>
+          <p:nvPr>
+            <p:ph type="title"/>
+          </p:nvPr>
+        </p:nvSpPr>
+        <p:spPr>
+          <a:xfrm>
+            <a:off x="390788" y="60120"/>
+            <a:ext cx="10886813" cy="479167"/>
+          </a:xfrm>
+        </p:spPr>
+        <p:txBody>
+          <a:bodyPr anchor="ctr">
+            <a:noAutofit/>
+          </a:bodyPr>
+          <a:lstStyle/>
+          <a:p>
+            <a:r>
+              <a:rPr lang="en-US" sz="3600" dirty="0"/>
+              <a:t>Sequence Diagram </a:t>
+            </a:r>
+            <a:r>
+              <a:rPr lang="en-US" sz="2000" dirty="0"/>
+              <a:t>– [Test] : Enable BPM</a:t>
+            </a:r>
+          </a:p>
+        </p:txBody>
+      </p:sp>
+      <p:sp>
+        <p:nvSpPr>
+          <p:cNvPr id="5" name="Rounded Rectangle 4">
+            <a:extLst>
+              <a:ext uri="{FF2B5EF4-FFF2-40B4-BE49-F238E27FC236}">
+                <a16:creationId xmlns:a16="http://schemas.microsoft.com/office/drawing/2014/main" id="{6376851D-EB30-EC40-9684-727591A0F50B}"/>
+              </a:ext>
+            </a:extLst>
+          </p:cNvPr>
+          <p:cNvSpPr/>
+          <p:nvPr/>
+        </p:nvSpPr>
+        <p:spPr>
+          <a:xfrm>
+            <a:off x="675598" y="685132"/>
+            <a:ext cx="1239127" cy="619013"/>
+          </a:xfrm>
+          <a:prstGeom prst="roundRect">
+            <a:avLst/>
+          </a:prstGeom>
+          <a:solidFill>
+            <a:srgbClr val="CD8E7F"/>
+          </a:solidFill>
+          <a:ln>
+            <a:noFill/>
+          </a:ln>
+        </p:spPr>
+        <p:style>
+          <a:lnRef idx="2">
+            <a:schemeClr val="accent1">
+              <a:shade val="50000"/>
+            </a:schemeClr>
+          </a:lnRef>
+          <a:fillRef idx="1">
+            <a:schemeClr val="accent1"/>
+          </a:fillRef>
+          <a:effectRef idx="0">
+            <a:schemeClr val="accent1"/>
+          </a:effectRef>
+          <a:fontRef idx="minor">
+            <a:schemeClr val="lt1"/>
+          </a:fontRef>
+        </p:style>
+        <p:txBody>
+          <a:bodyPr rtlCol="0" anchor="ctr"/>
+          <a:lstStyle/>
+          <a:p>
+            <a:pPr algn="ctr"/>
+            <a:r>
+              <a:rPr lang="en-US" sz="1200" dirty="0"/>
+              <a:t>Container Anomaly Test</a:t>
+            </a:r>
+          </a:p>
+        </p:txBody>
+      </p:sp>
+      <p:sp>
+        <p:nvSpPr>
+          <p:cNvPr id="6" name="Rounded Rectangle 5">
+            <a:extLst>
+              <a:ext uri="{FF2B5EF4-FFF2-40B4-BE49-F238E27FC236}">
+                <a16:creationId xmlns:a16="http://schemas.microsoft.com/office/drawing/2014/main" id="{B480FF3B-BB08-FB48-9A87-5E412FDDE3D2}"/>
+              </a:ext>
+            </a:extLst>
+          </p:cNvPr>
+          <p:cNvSpPr/>
+          <p:nvPr/>
+        </p:nvSpPr>
+        <p:spPr>
+          <a:xfrm>
+            <a:off x="10679640" y="656721"/>
+            <a:ext cx="1135385" cy="695993"/>
+          </a:xfrm>
+          <a:prstGeom prst="roundRect">
+            <a:avLst/>
+          </a:prstGeom>
+          <a:solidFill>
+            <a:srgbClr val="CD8E7F"/>
+          </a:solidFill>
+          <a:ln>
+            <a:noFill/>
+          </a:ln>
+        </p:spPr>
+        <p:style>
+          <a:lnRef idx="2">
+            <a:schemeClr val="accent1">
+              <a:shade val="50000"/>
+            </a:schemeClr>
+          </a:lnRef>
+          <a:fillRef idx="1">
+            <a:schemeClr val="accent1"/>
+          </a:fillRef>
+          <a:effectRef idx="0">
+            <a:schemeClr val="accent1"/>
+          </a:effectRef>
+          <a:fontRef idx="minor">
+            <a:schemeClr val="lt1"/>
+          </a:fontRef>
+        </p:style>
+        <p:txBody>
+          <a:bodyPr rtlCol="0" anchor="ctr"/>
+          <a:lstStyle/>
+          <a:p>
+            <a:pPr algn="ctr"/>
+            <a:r>
+              <a:rPr lang="en-US" sz="1200" dirty="0"/>
+              <a:t>Voyages</a:t>
+            </a:r>
+          </a:p>
+        </p:txBody>
+      </p:sp>
+      <p:sp>
+        <p:nvSpPr>
+          <p:cNvPr id="7" name="Rounded Rectangle 6">
+            <a:extLst>
+              <a:ext uri="{FF2B5EF4-FFF2-40B4-BE49-F238E27FC236}">
+                <a16:creationId xmlns:a16="http://schemas.microsoft.com/office/drawing/2014/main" id="{8C6EB9B0-9301-CA48-9375-B174FEC3D319}"/>
+              </a:ext>
+            </a:extLst>
+          </p:cNvPr>
+          <p:cNvSpPr/>
+          <p:nvPr/>
+        </p:nvSpPr>
+        <p:spPr>
+          <a:xfrm>
+            <a:off x="8297249" y="656201"/>
+            <a:ext cx="999779" cy="688365"/>
+          </a:xfrm>
+          <a:prstGeom prst="roundRect">
+            <a:avLst/>
+          </a:prstGeom>
+          <a:solidFill>
+            <a:srgbClr val="CD8E7F"/>
+          </a:solidFill>
+          <a:ln>
+            <a:noFill/>
+          </a:ln>
+        </p:spPr>
+        <p:style>
+          <a:lnRef idx="2">
+            <a:schemeClr val="accent1">
+              <a:shade val="50000"/>
+            </a:schemeClr>
+          </a:lnRef>
+          <a:fillRef idx="1">
+            <a:schemeClr val="accent1"/>
+          </a:fillRef>
+          <a:effectRef idx="0">
+            <a:schemeClr val="accent1"/>
+          </a:effectRef>
+          <a:fontRef idx="minor">
+            <a:schemeClr val="lt1"/>
+          </a:fontRef>
+        </p:style>
+        <p:txBody>
+          <a:bodyPr rtlCol="0" anchor="ctr"/>
+          <a:lstStyle/>
+          <a:p>
+            <a:pPr algn="ctr"/>
+            <a:r>
+              <a:rPr lang="en-US" sz="1200" dirty="0"/>
+              <a:t>Order Query</a:t>
+            </a:r>
+          </a:p>
+        </p:txBody>
+      </p:sp>
+      <p:cxnSp>
+        <p:nvCxnSpPr>
+          <p:cNvPr id="9" name="Straight Connector 8">
+            <a:extLst>
+              <a:ext uri="{FF2B5EF4-FFF2-40B4-BE49-F238E27FC236}">
+                <a16:creationId xmlns:a16="http://schemas.microsoft.com/office/drawing/2014/main" id="{FE101728-0F3D-5E48-BB92-85CCCC7E13AB}"/>
+              </a:ext>
+            </a:extLst>
+          </p:cNvPr>
+          <p:cNvCxnSpPr>
+            <a:cxnSpLocks/>
+          </p:cNvCxnSpPr>
+          <p:nvPr/>
+        </p:nvCxnSpPr>
+        <p:spPr>
+          <a:xfrm>
+            <a:off x="8797139" y="1344566"/>
+            <a:ext cx="46173" cy="4983720"/>
+          </a:xfrm>
+          <a:prstGeom prst="line">
+            <a:avLst/>
+          </a:prstGeom>
+          <a:ln>
+            <a:solidFill>
+              <a:schemeClr val="accent1"/>
+            </a:solidFill>
+            <a:prstDash val="sysDot"/>
+          </a:ln>
+          <a:effectLst/>
+        </p:spPr>
+        <p:style>
+          <a:lnRef idx="2">
+            <a:schemeClr val="accent1"/>
+          </a:lnRef>
+          <a:fillRef idx="0">
+            <a:schemeClr val="accent1"/>
+          </a:fillRef>
+          <a:effectRef idx="1">
+            <a:schemeClr val="accent1"/>
+          </a:effectRef>
+          <a:fontRef idx="minor">
+            <a:schemeClr val="tx1"/>
+          </a:fontRef>
+        </p:style>
+      </p:cxnSp>
+      <p:cxnSp>
+        <p:nvCxnSpPr>
+          <p:cNvPr id="13" name="Straight Connector 12">
+            <a:extLst>
+              <a:ext uri="{FF2B5EF4-FFF2-40B4-BE49-F238E27FC236}">
+                <a16:creationId xmlns:a16="http://schemas.microsoft.com/office/drawing/2014/main" id="{1BA52A56-9158-F348-ABC2-85CD52367453}"/>
+              </a:ext>
+            </a:extLst>
+          </p:cNvPr>
+          <p:cNvCxnSpPr>
+            <a:cxnSpLocks/>
+          </p:cNvCxnSpPr>
+          <p:nvPr/>
+        </p:nvCxnSpPr>
+        <p:spPr>
+          <a:xfrm>
+            <a:off x="1280097" y="1297580"/>
+            <a:ext cx="0" cy="4800022"/>
+          </a:xfrm>
+          <a:prstGeom prst="line">
+            <a:avLst/>
+          </a:prstGeom>
+          <a:ln>
+            <a:solidFill>
+              <a:schemeClr val="accent1"/>
+            </a:solidFill>
+          </a:ln>
+          <a:effectLst/>
+        </p:spPr>
+        <p:style>
+          <a:lnRef idx="2">
+            <a:schemeClr val="accent1"/>
+          </a:lnRef>
+          <a:fillRef idx="0">
+            <a:schemeClr val="accent1"/>
+          </a:fillRef>
+          <a:effectRef idx="1">
+            <a:schemeClr val="accent1"/>
+          </a:effectRef>
+          <a:fontRef idx="minor">
+            <a:schemeClr val="tx1"/>
+          </a:fontRef>
+        </p:style>
+      </p:cxnSp>
+      <p:grpSp>
+        <p:nvGrpSpPr>
+          <p:cNvPr id="3" name="Group 2">
+            <a:extLst>
+              <a:ext uri="{FF2B5EF4-FFF2-40B4-BE49-F238E27FC236}">
+                <a16:creationId xmlns:a16="http://schemas.microsoft.com/office/drawing/2014/main" id="{5678EE10-3436-A74C-B1D7-1748C2828578}"/>
+              </a:ext>
+            </a:extLst>
+          </p:cNvPr>
+          <p:cNvGrpSpPr/>
+          <p:nvPr/>
+        </p:nvGrpSpPr>
+        <p:grpSpPr>
+          <a:xfrm>
+            <a:off x="3519061" y="734840"/>
+            <a:ext cx="732893" cy="651507"/>
+            <a:chOff x="2818985" y="1424735"/>
+            <a:chExt cx="732893" cy="647549"/>
+          </a:xfrm>
+        </p:grpSpPr>
+        <p:sp>
+          <p:nvSpPr>
+            <p:cNvPr id="23" name="Rounded Rectangle 22">
+              <a:extLst>
+                <a:ext uri="{FF2B5EF4-FFF2-40B4-BE49-F238E27FC236}">
+                  <a16:creationId xmlns:a16="http://schemas.microsoft.com/office/drawing/2014/main" id="{3C0FBF09-2F78-3445-AACC-A4B17348D220}"/>
+                </a:ext>
+              </a:extLst>
+            </p:cNvPr>
+            <p:cNvSpPr/>
+            <p:nvPr/>
+          </p:nvSpPr>
+          <p:spPr bwMode="auto">
+            <a:xfrm>
+              <a:off x="2940343" y="1731449"/>
+              <a:ext cx="146861" cy="340835"/>
+            </a:xfrm>
+            <a:prstGeom prst="roundRect">
+              <a:avLst/>
+            </a:prstGeom>
+            <a:solidFill>
+              <a:schemeClr val="bg2"/>
+            </a:solidFill>
+            <a:ln>
+              <a:solidFill>
+                <a:schemeClr val="bg1"/>
+              </a:solidFill>
+              <a:prstDash val="solid"/>
+              <a:headEnd type="none" w="med" len="med"/>
+              <a:tailEnd type="none" w="med" len="med"/>
+            </a:ln>
+            <a:effectLst/>
+          </p:spPr>
+          <p:style>
+            <a:lnRef idx="1">
+              <a:schemeClr val="accent5"/>
+            </a:lnRef>
+            <a:fillRef idx="3">
+              <a:schemeClr val="accent5"/>
+            </a:fillRef>
+            <a:effectRef idx="2">
+              <a:schemeClr val="accent5"/>
+            </a:effectRef>
+            <a:fontRef idx="minor">
+              <a:schemeClr val="lt1"/>
+            </a:fontRef>
+          </p:style>
+          <p:txBody>
+            <a:bodyPr vert="horz" wrap="square" lIns="0" tIns="0" rIns="0" bIns="0" numCol="1" rtlCol="0" anchor="ctr" anchorCtr="0" compatLnSpc="1">
+              <a:prstTxWarp prst="textNoShape">
+                <a:avLst/>
+              </a:prstTxWarp>
+              <a:noAutofit/>
+            </a:bodyPr>
+            <a:lstStyle/>
+            <a:p>
+              <a:pPr algn="ctr" defTabSz="1219170" fontAlgn="base">
+                <a:lnSpc>
+                  <a:spcPct val="90000"/>
+                </a:lnSpc>
+                <a:spcBef>
+                  <a:spcPct val="0"/>
+                </a:spcBef>
+                <a:spcAft>
+                  <a:spcPct val="0"/>
+                </a:spcAft>
+              </a:pPr>
+              <a:r>
+                <a:rPr lang="en-US" sz="1200" dirty="0">
+                  <a:solidFill>
+                    <a:schemeClr val="bg1"/>
+                  </a:solidFill>
+                </a:rPr>
+                <a:t>0</a:t>
+              </a:r>
+              <a:endParaRPr lang="en-US" sz="667" dirty="0">
+                <a:solidFill>
+                  <a:schemeClr val="bg1"/>
+                </a:solidFill>
+              </a:endParaRPr>
+            </a:p>
+          </p:txBody>
+        </p:sp>
+        <p:sp>
+          <p:nvSpPr>
+            <p:cNvPr id="24" name="Rounded Rectangle 23">
+              <a:extLst>
+                <a:ext uri="{FF2B5EF4-FFF2-40B4-BE49-F238E27FC236}">
+                  <a16:creationId xmlns:a16="http://schemas.microsoft.com/office/drawing/2014/main" id="{EE64C7C1-2730-EF4C-B593-863E261A2DAC}"/>
+                </a:ext>
+              </a:extLst>
+            </p:cNvPr>
+            <p:cNvSpPr/>
+            <p:nvPr/>
+          </p:nvSpPr>
+          <p:spPr bwMode="auto">
+            <a:xfrm>
+              <a:off x="3095280" y="1731449"/>
+              <a:ext cx="148586" cy="340835"/>
+            </a:xfrm>
+            <a:prstGeom prst="roundRect">
+              <a:avLst/>
+            </a:prstGeom>
+            <a:solidFill>
+              <a:schemeClr val="bg2"/>
+            </a:solidFill>
+            <a:ln>
+              <a:solidFill>
+                <a:schemeClr val="bg1"/>
+              </a:solidFill>
+              <a:prstDash val="solid"/>
+              <a:headEnd type="none" w="med" len="med"/>
+              <a:tailEnd type="none" w="med" len="med"/>
+            </a:ln>
+            <a:effectLst/>
+          </p:spPr>
+          <p:style>
+            <a:lnRef idx="1">
+              <a:schemeClr val="accent5"/>
+            </a:lnRef>
+            <a:fillRef idx="3">
+              <a:schemeClr val="accent5"/>
+            </a:fillRef>
+            <a:effectRef idx="2">
+              <a:schemeClr val="accent5"/>
+            </a:effectRef>
+            <a:fontRef idx="minor">
+              <a:schemeClr val="lt1"/>
+            </a:fontRef>
+          </p:style>
+          <p:txBody>
+            <a:bodyPr vert="horz" wrap="square" lIns="0" tIns="0" rIns="0" bIns="0" numCol="1" rtlCol="0" anchor="ctr" anchorCtr="0" compatLnSpc="1">
+              <a:prstTxWarp prst="textNoShape">
+                <a:avLst/>
+              </a:prstTxWarp>
+              <a:noAutofit/>
+            </a:bodyPr>
+            <a:lstStyle/>
+            <a:p>
+              <a:pPr algn="ctr" defTabSz="1219170" fontAlgn="base">
+                <a:lnSpc>
+                  <a:spcPct val="90000"/>
+                </a:lnSpc>
+                <a:spcBef>
+                  <a:spcPct val="0"/>
+                </a:spcBef>
+                <a:spcAft>
+                  <a:spcPct val="0"/>
+                </a:spcAft>
+              </a:pPr>
+              <a:r>
+                <a:rPr lang="en-US" sz="1200" dirty="0">
+                  <a:solidFill>
+                    <a:schemeClr val="bg1"/>
+                  </a:solidFill>
+                </a:rPr>
+                <a:t>1</a:t>
+              </a:r>
+              <a:endParaRPr lang="en-US" sz="667" dirty="0">
+                <a:solidFill>
+                  <a:schemeClr val="bg1"/>
+                </a:solidFill>
+              </a:endParaRPr>
+            </a:p>
+          </p:txBody>
+        </p:sp>
+        <p:sp>
+          <p:nvSpPr>
+            <p:cNvPr id="25" name="Rounded Rectangle 24">
+              <a:extLst>
+                <a:ext uri="{FF2B5EF4-FFF2-40B4-BE49-F238E27FC236}">
+                  <a16:creationId xmlns:a16="http://schemas.microsoft.com/office/drawing/2014/main" id="{54D4C2F0-EAAD-3D44-A79B-E17107A7A12B}"/>
+                </a:ext>
+              </a:extLst>
+            </p:cNvPr>
+            <p:cNvSpPr/>
+            <p:nvPr/>
+          </p:nvSpPr>
+          <p:spPr bwMode="auto">
+            <a:xfrm>
+              <a:off x="3236708" y="1731449"/>
+              <a:ext cx="148586" cy="340835"/>
+            </a:xfrm>
+            <a:prstGeom prst="roundRect">
+              <a:avLst/>
+            </a:prstGeom>
+            <a:solidFill>
+              <a:schemeClr val="bg2"/>
+            </a:solidFill>
+            <a:ln>
+              <a:solidFill>
+                <a:schemeClr val="bg1"/>
+              </a:solidFill>
+              <a:prstDash val="solid"/>
+              <a:headEnd type="none" w="med" len="med"/>
+              <a:tailEnd type="none" w="med" len="med"/>
+            </a:ln>
+            <a:effectLst/>
+          </p:spPr>
+          <p:style>
+            <a:lnRef idx="1">
+              <a:schemeClr val="accent5"/>
+            </a:lnRef>
+            <a:fillRef idx="3">
+              <a:schemeClr val="accent5"/>
+            </a:fillRef>
+            <a:effectRef idx="2">
+              <a:schemeClr val="accent5"/>
+            </a:effectRef>
+            <a:fontRef idx="minor">
+              <a:schemeClr val="lt1"/>
+            </a:fontRef>
+          </p:style>
+          <p:txBody>
+            <a:bodyPr vert="horz" wrap="square" lIns="0" tIns="0" rIns="0" bIns="0" numCol="1" rtlCol="0" anchor="ctr" anchorCtr="0" compatLnSpc="1">
+              <a:prstTxWarp prst="textNoShape">
+                <a:avLst/>
+              </a:prstTxWarp>
+              <a:noAutofit/>
+            </a:bodyPr>
+            <a:lstStyle/>
+            <a:p>
+              <a:pPr algn="ctr" defTabSz="1219170" fontAlgn="base">
+                <a:lnSpc>
+                  <a:spcPct val="90000"/>
+                </a:lnSpc>
+                <a:spcBef>
+                  <a:spcPct val="0"/>
+                </a:spcBef>
+                <a:spcAft>
+                  <a:spcPct val="0"/>
+                </a:spcAft>
+              </a:pPr>
+              <a:r>
+                <a:rPr lang="en-US" sz="1200" dirty="0">
+                  <a:solidFill>
+                    <a:schemeClr val="bg1"/>
+                  </a:solidFill>
+                </a:rPr>
+                <a:t>2</a:t>
+              </a:r>
+              <a:endParaRPr lang="en-US" sz="667" dirty="0">
+                <a:solidFill>
+                  <a:schemeClr val="bg1"/>
+                </a:solidFill>
+              </a:endParaRPr>
+            </a:p>
+          </p:txBody>
+        </p:sp>
+        <p:sp>
+          <p:nvSpPr>
+            <p:cNvPr id="26" name="TextBox 25">
+              <a:extLst>
+                <a:ext uri="{FF2B5EF4-FFF2-40B4-BE49-F238E27FC236}">
+                  <a16:creationId xmlns:a16="http://schemas.microsoft.com/office/drawing/2014/main" id="{5F769FB6-E5B1-6C4C-A619-64ED4A003362}"/>
+                </a:ext>
+              </a:extLst>
+            </p:cNvPr>
+            <p:cNvSpPr txBox="1"/>
+            <p:nvPr/>
+          </p:nvSpPr>
+          <p:spPr>
+            <a:xfrm>
+              <a:off x="2818985" y="1424735"/>
+              <a:ext cx="732893" cy="246221"/>
+            </a:xfrm>
+            <a:prstGeom prst="rect">
+              <a:avLst/>
+            </a:prstGeom>
+            <a:noFill/>
+          </p:spPr>
+          <p:txBody>
+            <a:bodyPr wrap="none" rtlCol="0">
+              <a:spAutoFit/>
+            </a:bodyPr>
+            <a:lstStyle/>
+            <a:p>
+              <a:r>
+                <a:rPr lang="en-US" sz="1000" dirty="0">
+                  <a:solidFill>
+                    <a:schemeClr val="accent1">
+                      <a:lumMod val="25000"/>
+                    </a:schemeClr>
+                  </a:solidFill>
+                </a:rPr>
+                <a:t>containers</a:t>
+              </a:r>
+            </a:p>
+          </p:txBody>
+        </p:sp>
+      </p:grpSp>
+      <p:sp>
+        <p:nvSpPr>
+          <p:cNvPr id="27" name="AutoShape 4">
+            <a:extLst>
+              <a:ext uri="{FF2B5EF4-FFF2-40B4-BE49-F238E27FC236}">
+                <a16:creationId xmlns:a16="http://schemas.microsoft.com/office/drawing/2014/main" id="{6AF712C3-5319-A14C-871E-ED55D5BC2AFE}"/>
+              </a:ext>
+            </a:extLst>
+          </p:cNvPr>
+          <p:cNvSpPr>
+            <a:spLocks noChangeArrowheads="1"/>
+          </p:cNvSpPr>
+          <p:nvPr/>
+        </p:nvSpPr>
+        <p:spPr bwMode="auto">
+          <a:xfrm>
+            <a:off x="2246382" y="628690"/>
+            <a:ext cx="4377775" cy="899574"/>
+          </a:xfrm>
+          <a:prstGeom prst="roundRect">
+            <a:avLst>
+              <a:gd name="adj" fmla="val 7117"/>
+            </a:avLst>
+          </a:prstGeom>
+          <a:noFill/>
+          <a:ln w="12700">
+            <a:solidFill>
+              <a:srgbClr val="5596E6">
+                <a:lumMod val="50000"/>
+              </a:srgbClr>
+            </a:solidFill>
+            <a:prstDash val="dash"/>
+            <a:round/>
+            <a:headEnd/>
+            <a:tailEnd/>
+          </a:ln>
+        </p:spPr>
+        <p:txBody>
+          <a:bodyPr lIns="0" tIns="0" rIns="0" bIns="0" anchor="b" anchorCtr="1"/>
+          <a:lstStyle/>
+          <a:p>
+            <a:pPr algn="ctr" defTabSz="1219170" eaLnBrk="1" fontAlgn="auto" hangingPunct="1">
+              <a:spcBef>
+                <a:spcPts val="0"/>
+              </a:spcBef>
+              <a:spcAft>
+                <a:spcPts val="0"/>
+              </a:spcAft>
+              <a:defRPr/>
+            </a:pPr>
+            <a:endParaRPr lang="en-US" sz="1333" kern="0" dirty="0">
+              <a:solidFill>
+                <a:srgbClr val="6D7777"/>
+              </a:solidFill>
+            </a:endParaRPr>
+          </a:p>
+        </p:txBody>
+      </p:sp>
+      <p:pic>
+        <p:nvPicPr>
+          <p:cNvPr id="28" name="Picture 27">
+            <a:extLst>
+              <a:ext uri="{FF2B5EF4-FFF2-40B4-BE49-F238E27FC236}">
+                <a16:creationId xmlns:a16="http://schemas.microsoft.com/office/drawing/2014/main" id="{38AF52D8-AD34-D041-AD87-90558DC31D05}"/>
+              </a:ext>
+            </a:extLst>
+          </p:cNvPr>
+          <p:cNvPicPr>
+            <a:picLocks noChangeAspect="1"/>
+          </p:cNvPicPr>
+          <p:nvPr/>
+        </p:nvPicPr>
+        <p:blipFill>
+          <a:blip r:embed="rId2">
+            <a:biLevel thresh="75000"/>
+            <a:extLst>
+              <a:ext uri="{BEBA8EAE-BF5A-486C-A8C5-ECC9F3942E4B}">
+                <a14:imgProps xmlns:a14="http://schemas.microsoft.com/office/drawing/2010/main">
+                  <a14:imgLayer r:embed="rId3">
+                    <a14:imgEffect>
+                      <a14:artisticPhotocopy/>
+                    </a14:imgEffect>
+                  </a14:imgLayer>
+                </a14:imgProps>
+              </a:ext>
+              <a:ext uri="{28A0092B-C50C-407E-A947-70E740481C1C}">
+                <a14:useLocalDpi xmlns:a14="http://schemas.microsoft.com/office/drawing/2010/main" val="0"/>
+              </a:ext>
+            </a:extLst>
+          </a:blip>
+          <a:stretch>
+            <a:fillRect/>
+          </a:stretch>
+        </p:blipFill>
+        <p:spPr>
+          <a:xfrm>
+            <a:off x="2484268" y="826887"/>
+            <a:ext cx="959343" cy="504271"/>
+          </a:xfrm>
+          <a:prstGeom prst="rect">
+            <a:avLst/>
+          </a:prstGeom>
+        </p:spPr>
+      </p:pic>
+      <p:sp>
+        <p:nvSpPr>
+          <p:cNvPr id="29" name="Rounded Rectangle 28">
+            <a:extLst>
+              <a:ext uri="{FF2B5EF4-FFF2-40B4-BE49-F238E27FC236}">
+                <a16:creationId xmlns:a16="http://schemas.microsoft.com/office/drawing/2014/main" id="{523FB07B-7599-2D42-B589-69A302AEBE37}"/>
+              </a:ext>
+            </a:extLst>
+          </p:cNvPr>
+          <p:cNvSpPr/>
+          <p:nvPr/>
+        </p:nvSpPr>
+        <p:spPr>
+          <a:xfrm>
+            <a:off x="6927378" y="656200"/>
+            <a:ext cx="1159906" cy="688366"/>
+          </a:xfrm>
+          <a:prstGeom prst="roundRect">
+            <a:avLst/>
+          </a:prstGeom>
+          <a:solidFill>
+            <a:srgbClr val="CD8E7F"/>
+          </a:solidFill>
+          <a:ln>
+            <a:noFill/>
+          </a:ln>
+        </p:spPr>
+        <p:style>
+          <a:lnRef idx="2">
+            <a:schemeClr val="accent1">
+              <a:shade val="50000"/>
+            </a:schemeClr>
+          </a:lnRef>
+          <a:fillRef idx="1">
+            <a:schemeClr val="accent1"/>
+          </a:fillRef>
+          <a:effectRef idx="0">
+            <a:schemeClr val="accent1"/>
+          </a:effectRef>
+          <a:fontRef idx="minor">
+            <a:schemeClr val="lt1"/>
+          </a:fontRef>
+        </p:style>
+        <p:txBody>
+          <a:bodyPr rtlCol="0" anchor="ctr"/>
+          <a:lstStyle/>
+          <a:p>
+            <a:pPr algn="ctr"/>
+            <a:r>
+              <a:rPr lang="en-US" sz="1200" dirty="0"/>
+              <a:t>Order Command</a:t>
+            </a:r>
+          </a:p>
+        </p:txBody>
+      </p:sp>
+      <p:cxnSp>
+        <p:nvCxnSpPr>
+          <p:cNvPr id="30" name="Straight Connector 29">
+            <a:extLst>
+              <a:ext uri="{FF2B5EF4-FFF2-40B4-BE49-F238E27FC236}">
+                <a16:creationId xmlns:a16="http://schemas.microsoft.com/office/drawing/2014/main" id="{99107328-FE14-7247-BC64-DD094759DAC9}"/>
+              </a:ext>
+            </a:extLst>
+          </p:cNvPr>
+          <p:cNvCxnSpPr>
+            <a:cxnSpLocks/>
+          </p:cNvCxnSpPr>
+          <p:nvPr/>
+        </p:nvCxnSpPr>
+        <p:spPr>
+          <a:xfrm>
+            <a:off x="7507331" y="1344566"/>
+            <a:ext cx="67" cy="4839580"/>
+          </a:xfrm>
+          <a:prstGeom prst="line">
+            <a:avLst/>
+          </a:prstGeom>
+          <a:ln>
+            <a:solidFill>
+              <a:schemeClr val="accent1"/>
+            </a:solidFill>
+            <a:prstDash val="sysDot"/>
+          </a:ln>
+          <a:effectLst/>
+        </p:spPr>
+        <p:style>
+          <a:lnRef idx="2">
+            <a:schemeClr val="accent1"/>
+          </a:lnRef>
+          <a:fillRef idx="0">
+            <a:schemeClr val="accent1"/>
+          </a:fillRef>
+          <a:effectRef idx="1">
+            <a:schemeClr val="accent1"/>
+          </a:effectRef>
+          <a:fontRef idx="minor">
+            <a:schemeClr val="tx1"/>
+          </a:fontRef>
+        </p:style>
+      </p:cxnSp>
+      <p:sp>
+        <p:nvSpPr>
+          <p:cNvPr id="49" name="Rounded Rectangle 48">
+            <a:extLst>
+              <a:ext uri="{FF2B5EF4-FFF2-40B4-BE49-F238E27FC236}">
+                <a16:creationId xmlns:a16="http://schemas.microsoft.com/office/drawing/2014/main" id="{96A319E2-968D-9D44-98D1-D9F7D2A109F1}"/>
+              </a:ext>
+            </a:extLst>
+          </p:cNvPr>
+          <p:cNvSpPr/>
+          <p:nvPr/>
+        </p:nvSpPr>
+        <p:spPr>
+          <a:xfrm>
+            <a:off x="9506993" y="656200"/>
+            <a:ext cx="999125" cy="686482"/>
+          </a:xfrm>
+          <a:prstGeom prst="roundRect">
+            <a:avLst/>
+          </a:prstGeom>
+          <a:solidFill>
+            <a:srgbClr val="CD8E7F"/>
+          </a:solidFill>
+          <a:ln>
+            <a:noFill/>
+          </a:ln>
+        </p:spPr>
+        <p:style>
+          <a:lnRef idx="2">
+            <a:schemeClr val="accent1">
+              <a:shade val="50000"/>
+            </a:schemeClr>
+          </a:lnRef>
+          <a:fillRef idx="1">
+            <a:schemeClr val="accent1"/>
+          </a:fillRef>
+          <a:effectRef idx="0">
+            <a:schemeClr val="accent1"/>
+          </a:effectRef>
+          <a:fontRef idx="minor">
+            <a:schemeClr val="lt1"/>
+          </a:fontRef>
+        </p:style>
+        <p:txBody>
+          <a:bodyPr rtlCol="0" anchor="ctr"/>
+          <a:lstStyle/>
+          <a:p>
+            <a:pPr algn="ctr"/>
+            <a:r>
+              <a:rPr lang="en-US" sz="1200" dirty="0"/>
+              <a:t>Spring Containers</a:t>
+            </a:r>
+          </a:p>
+        </p:txBody>
+      </p:sp>
+      <p:cxnSp>
+        <p:nvCxnSpPr>
+          <p:cNvPr id="50" name="Straight Connector 49">
+            <a:extLst>
+              <a:ext uri="{FF2B5EF4-FFF2-40B4-BE49-F238E27FC236}">
+                <a16:creationId xmlns:a16="http://schemas.microsoft.com/office/drawing/2014/main" id="{82FA8B23-EDB8-A345-A190-D56010318D2D}"/>
+              </a:ext>
+            </a:extLst>
+          </p:cNvPr>
+          <p:cNvCxnSpPr>
+            <a:cxnSpLocks/>
+          </p:cNvCxnSpPr>
+          <p:nvPr/>
+        </p:nvCxnSpPr>
+        <p:spPr>
+          <a:xfrm>
+            <a:off x="10006556" y="1342682"/>
+            <a:ext cx="33090" cy="4841464"/>
+          </a:xfrm>
+          <a:prstGeom prst="line">
+            <a:avLst/>
+          </a:prstGeom>
+          <a:ln>
+            <a:solidFill>
+              <a:schemeClr val="accent1"/>
+            </a:solidFill>
+            <a:prstDash val="sysDot"/>
+          </a:ln>
+          <a:effectLst/>
+        </p:spPr>
+        <p:style>
+          <a:lnRef idx="2">
+            <a:schemeClr val="accent1"/>
+          </a:lnRef>
+          <a:fillRef idx="0">
+            <a:schemeClr val="accent1"/>
+          </a:fillRef>
+          <a:effectRef idx="1">
+            <a:schemeClr val="accent1"/>
+          </a:effectRef>
+          <a:fontRef idx="minor">
+            <a:schemeClr val="tx1"/>
+          </a:fontRef>
+        </p:style>
+      </p:cxnSp>
+      <p:grpSp>
+        <p:nvGrpSpPr>
+          <p:cNvPr id="18" name="Group 17">
+            <a:extLst>
+              <a:ext uri="{FF2B5EF4-FFF2-40B4-BE49-F238E27FC236}">
+                <a16:creationId xmlns:a16="http://schemas.microsoft.com/office/drawing/2014/main" id="{1203E6DB-0E57-AB47-8F57-BD657E3A8980}"/>
+              </a:ext>
+            </a:extLst>
+          </p:cNvPr>
+          <p:cNvGrpSpPr/>
+          <p:nvPr/>
+        </p:nvGrpSpPr>
+        <p:grpSpPr>
+          <a:xfrm>
+            <a:off x="4250518" y="720007"/>
+            <a:ext cx="1059906" cy="636766"/>
+            <a:chOff x="2649712" y="2855073"/>
+            <a:chExt cx="1059906" cy="636766"/>
+          </a:xfrm>
+        </p:grpSpPr>
+        <p:sp>
+          <p:nvSpPr>
+            <p:cNvPr id="47" name="Rounded Rectangle 46">
+              <a:extLst>
+                <a:ext uri="{FF2B5EF4-FFF2-40B4-BE49-F238E27FC236}">
+                  <a16:creationId xmlns:a16="http://schemas.microsoft.com/office/drawing/2014/main" id="{BC86C5F4-C329-7840-B977-3DF7C1B7A90E}"/>
+                </a:ext>
+              </a:extLst>
+            </p:cNvPr>
+            <p:cNvSpPr/>
+            <p:nvPr/>
+          </p:nvSpPr>
+          <p:spPr bwMode="auto">
+            <a:xfrm>
+              <a:off x="2932267" y="3151004"/>
+              <a:ext cx="146861" cy="340835"/>
+            </a:xfrm>
+            <a:prstGeom prst="roundRect">
+              <a:avLst/>
+            </a:prstGeom>
+            <a:solidFill>
+              <a:schemeClr val="bg2"/>
+            </a:solidFill>
+            <a:ln>
+              <a:solidFill>
+                <a:schemeClr val="bg1"/>
+              </a:solidFill>
+              <a:prstDash val="solid"/>
+              <a:headEnd type="none" w="med" len="med"/>
+              <a:tailEnd type="none" w="med" len="med"/>
+            </a:ln>
+            <a:effectLst/>
+          </p:spPr>
+          <p:style>
+            <a:lnRef idx="1">
+              <a:schemeClr val="accent5"/>
+            </a:lnRef>
+            <a:fillRef idx="3">
+              <a:schemeClr val="accent5"/>
+            </a:fillRef>
+            <a:effectRef idx="2">
+              <a:schemeClr val="accent5"/>
+            </a:effectRef>
+            <a:fontRef idx="minor">
+              <a:schemeClr val="lt1"/>
+            </a:fontRef>
+          </p:style>
+          <p:txBody>
+            <a:bodyPr vert="horz" wrap="square" lIns="0" tIns="0" rIns="0" bIns="0" numCol="1" rtlCol="0" anchor="ctr" anchorCtr="0" compatLnSpc="1">
+              <a:prstTxWarp prst="textNoShape">
+                <a:avLst/>
+              </a:prstTxWarp>
+              <a:noAutofit/>
+            </a:bodyPr>
+            <a:lstStyle/>
+            <a:p>
+              <a:pPr algn="ctr" defTabSz="1219170" fontAlgn="base">
+                <a:lnSpc>
+                  <a:spcPct val="90000"/>
+                </a:lnSpc>
+                <a:spcBef>
+                  <a:spcPct val="0"/>
+                </a:spcBef>
+                <a:spcAft>
+                  <a:spcPct val="0"/>
+                </a:spcAft>
+              </a:pPr>
+              <a:r>
+                <a:rPr lang="en-US" sz="1200" dirty="0">
+                  <a:solidFill>
+                    <a:schemeClr val="bg1"/>
+                  </a:solidFill>
+                </a:rPr>
+                <a:t>0</a:t>
+              </a:r>
+              <a:endParaRPr lang="en-US" sz="667" dirty="0">
+                <a:solidFill>
+                  <a:schemeClr val="bg1"/>
+                </a:solidFill>
+              </a:endParaRPr>
+            </a:p>
+          </p:txBody>
+        </p:sp>
+        <p:sp>
+          <p:nvSpPr>
+            <p:cNvPr id="48" name="Rounded Rectangle 47">
+              <a:extLst>
+                <a:ext uri="{FF2B5EF4-FFF2-40B4-BE49-F238E27FC236}">
+                  <a16:creationId xmlns:a16="http://schemas.microsoft.com/office/drawing/2014/main" id="{0486D77C-9BB1-0144-AFBD-B1CB441F90AD}"/>
+                </a:ext>
+              </a:extLst>
+            </p:cNvPr>
+            <p:cNvSpPr/>
+            <p:nvPr/>
+          </p:nvSpPr>
+          <p:spPr bwMode="auto">
+            <a:xfrm>
+              <a:off x="3087204" y="3151004"/>
+              <a:ext cx="148586" cy="340835"/>
+            </a:xfrm>
+            <a:prstGeom prst="roundRect">
+              <a:avLst/>
+            </a:prstGeom>
+            <a:solidFill>
+              <a:schemeClr val="bg2"/>
+            </a:solidFill>
+            <a:ln>
+              <a:solidFill>
+                <a:schemeClr val="bg1"/>
+              </a:solidFill>
+              <a:prstDash val="solid"/>
+              <a:headEnd type="none" w="med" len="med"/>
+              <a:tailEnd type="none" w="med" len="med"/>
+            </a:ln>
+            <a:effectLst/>
+          </p:spPr>
+          <p:style>
+            <a:lnRef idx="1">
+              <a:schemeClr val="accent5"/>
+            </a:lnRef>
+            <a:fillRef idx="3">
+              <a:schemeClr val="accent5"/>
+            </a:fillRef>
+            <a:effectRef idx="2">
+              <a:schemeClr val="accent5"/>
+            </a:effectRef>
+            <a:fontRef idx="minor">
+              <a:schemeClr val="lt1"/>
+            </a:fontRef>
+          </p:style>
+          <p:txBody>
+            <a:bodyPr vert="horz" wrap="square" lIns="0" tIns="0" rIns="0" bIns="0" numCol="1" rtlCol="0" anchor="ctr" anchorCtr="0" compatLnSpc="1">
+              <a:prstTxWarp prst="textNoShape">
+                <a:avLst/>
+              </a:prstTxWarp>
+              <a:noAutofit/>
+            </a:bodyPr>
+            <a:lstStyle/>
+            <a:p>
+              <a:pPr algn="ctr" defTabSz="1219170" fontAlgn="base">
+                <a:lnSpc>
+                  <a:spcPct val="90000"/>
+                </a:lnSpc>
+                <a:spcBef>
+                  <a:spcPct val="0"/>
+                </a:spcBef>
+                <a:spcAft>
+                  <a:spcPct val="0"/>
+                </a:spcAft>
+              </a:pPr>
+              <a:r>
+                <a:rPr lang="en-US" sz="1200" dirty="0">
+                  <a:solidFill>
+                    <a:schemeClr val="bg1"/>
+                  </a:solidFill>
+                </a:rPr>
+                <a:t>1</a:t>
+              </a:r>
+              <a:endParaRPr lang="en-US" sz="667" dirty="0">
+                <a:solidFill>
+                  <a:schemeClr val="bg1"/>
+                </a:solidFill>
+              </a:endParaRPr>
+            </a:p>
+          </p:txBody>
+        </p:sp>
+        <p:sp>
+          <p:nvSpPr>
+            <p:cNvPr id="52" name="Rounded Rectangle 51">
+              <a:extLst>
+                <a:ext uri="{FF2B5EF4-FFF2-40B4-BE49-F238E27FC236}">
+                  <a16:creationId xmlns:a16="http://schemas.microsoft.com/office/drawing/2014/main" id="{50F8C2AC-E7E9-D345-BBFC-553A27989074}"/>
+                </a:ext>
+              </a:extLst>
+            </p:cNvPr>
+            <p:cNvSpPr/>
+            <p:nvPr/>
+          </p:nvSpPr>
+          <p:spPr bwMode="auto">
+            <a:xfrm>
+              <a:off x="3228632" y="3151004"/>
+              <a:ext cx="148586" cy="340835"/>
+            </a:xfrm>
+            <a:prstGeom prst="roundRect">
+              <a:avLst/>
+            </a:prstGeom>
+            <a:solidFill>
+              <a:schemeClr val="bg2"/>
+            </a:solidFill>
+            <a:ln>
+              <a:solidFill>
+                <a:schemeClr val="bg1"/>
+              </a:solidFill>
+              <a:prstDash val="solid"/>
+              <a:headEnd type="none" w="med" len="med"/>
+              <a:tailEnd type="none" w="med" len="med"/>
+            </a:ln>
+            <a:effectLst/>
+          </p:spPr>
+          <p:style>
+            <a:lnRef idx="1">
+              <a:schemeClr val="accent5"/>
+            </a:lnRef>
+            <a:fillRef idx="3">
+              <a:schemeClr val="accent5"/>
+            </a:fillRef>
+            <a:effectRef idx="2">
+              <a:schemeClr val="accent5"/>
+            </a:effectRef>
+            <a:fontRef idx="minor">
+              <a:schemeClr val="lt1"/>
+            </a:fontRef>
+          </p:style>
+          <p:txBody>
+            <a:bodyPr vert="horz" wrap="square" lIns="0" tIns="0" rIns="0" bIns="0" numCol="1" rtlCol="0" anchor="ctr" anchorCtr="0" compatLnSpc="1">
+              <a:prstTxWarp prst="textNoShape">
+                <a:avLst/>
+              </a:prstTxWarp>
+              <a:noAutofit/>
+            </a:bodyPr>
+            <a:lstStyle/>
+            <a:p>
+              <a:pPr algn="ctr" defTabSz="1219170" fontAlgn="base">
+                <a:lnSpc>
+                  <a:spcPct val="90000"/>
+                </a:lnSpc>
+                <a:spcBef>
+                  <a:spcPct val="0"/>
+                </a:spcBef>
+                <a:spcAft>
+                  <a:spcPct val="0"/>
+                </a:spcAft>
+              </a:pPr>
+              <a:r>
+                <a:rPr lang="en-US" sz="1200" dirty="0">
+                  <a:solidFill>
+                    <a:schemeClr val="bg1"/>
+                  </a:solidFill>
+                </a:rPr>
+                <a:t>2</a:t>
+              </a:r>
+              <a:endParaRPr lang="en-US" sz="667" dirty="0">
+                <a:solidFill>
+                  <a:schemeClr val="bg1"/>
+                </a:solidFill>
+              </a:endParaRPr>
+            </a:p>
+          </p:txBody>
+        </p:sp>
+        <p:sp>
+          <p:nvSpPr>
+            <p:cNvPr id="55" name="TextBox 54">
+              <a:extLst>
+                <a:ext uri="{FF2B5EF4-FFF2-40B4-BE49-F238E27FC236}">
+                  <a16:creationId xmlns:a16="http://schemas.microsoft.com/office/drawing/2014/main" id="{203AFDF0-27AD-8741-A3E8-C24F93A06D9B}"/>
+                </a:ext>
+              </a:extLst>
+            </p:cNvPr>
+            <p:cNvSpPr txBox="1"/>
+            <p:nvPr/>
+          </p:nvSpPr>
+          <p:spPr>
+            <a:xfrm>
+              <a:off x="2649712" y="2855073"/>
+              <a:ext cx="1059906" cy="246221"/>
+            </a:xfrm>
+            <a:prstGeom prst="rect">
+              <a:avLst/>
+            </a:prstGeom>
+            <a:noFill/>
+          </p:spPr>
+          <p:txBody>
+            <a:bodyPr wrap="none" rtlCol="0">
+              <a:spAutoFit/>
+            </a:bodyPr>
+            <a:lstStyle/>
+            <a:p>
+              <a:r>
+                <a:rPr lang="en-US" sz="1000" dirty="0" err="1">
+                  <a:solidFill>
+                    <a:schemeClr val="accent1">
+                      <a:lumMod val="25000"/>
+                    </a:schemeClr>
+                  </a:solidFill>
+                </a:rPr>
+                <a:t>orderCommands</a:t>
+              </a:r>
+              <a:endParaRPr lang="en-US" sz="1000" dirty="0">
+                <a:solidFill>
+                  <a:schemeClr val="accent1">
+                    <a:lumMod val="25000"/>
+                  </a:schemeClr>
+                </a:solidFill>
+              </a:endParaRPr>
+            </a:p>
+          </p:txBody>
+        </p:sp>
+      </p:grpSp>
+      <p:grpSp>
+        <p:nvGrpSpPr>
+          <p:cNvPr id="21" name="Group 20">
+            <a:extLst>
+              <a:ext uri="{FF2B5EF4-FFF2-40B4-BE49-F238E27FC236}">
+                <a16:creationId xmlns:a16="http://schemas.microsoft.com/office/drawing/2014/main" id="{E36995D9-55DF-684B-ABF4-DC2720901674}"/>
+              </a:ext>
+            </a:extLst>
+          </p:cNvPr>
+          <p:cNvGrpSpPr/>
+          <p:nvPr/>
+        </p:nvGrpSpPr>
+        <p:grpSpPr>
+          <a:xfrm>
+            <a:off x="5527747" y="733240"/>
+            <a:ext cx="732893" cy="647549"/>
+            <a:chOff x="2943190" y="4391413"/>
+            <a:chExt cx="732893" cy="647549"/>
+          </a:xfrm>
+        </p:grpSpPr>
+        <p:sp>
+          <p:nvSpPr>
+            <p:cNvPr id="63" name="Rounded Rectangle 62">
+              <a:extLst>
+                <a:ext uri="{FF2B5EF4-FFF2-40B4-BE49-F238E27FC236}">
+                  <a16:creationId xmlns:a16="http://schemas.microsoft.com/office/drawing/2014/main" id="{459F526B-9C97-634D-8B54-64EB7125E129}"/>
+                </a:ext>
+              </a:extLst>
+            </p:cNvPr>
+            <p:cNvSpPr/>
+            <p:nvPr/>
+          </p:nvSpPr>
+          <p:spPr bwMode="auto">
+            <a:xfrm>
+              <a:off x="2963940" y="4698127"/>
+              <a:ext cx="146861" cy="340835"/>
+            </a:xfrm>
+            <a:prstGeom prst="roundRect">
+              <a:avLst/>
+            </a:prstGeom>
+            <a:solidFill>
+              <a:schemeClr val="bg2"/>
+            </a:solidFill>
+            <a:ln>
+              <a:solidFill>
+                <a:schemeClr val="bg1"/>
+              </a:solidFill>
+              <a:prstDash val="solid"/>
+              <a:headEnd type="none" w="med" len="med"/>
+              <a:tailEnd type="none" w="med" len="med"/>
+            </a:ln>
+            <a:effectLst/>
+          </p:spPr>
+          <p:style>
+            <a:lnRef idx="1">
+              <a:schemeClr val="accent5"/>
+            </a:lnRef>
+            <a:fillRef idx="3">
+              <a:schemeClr val="accent5"/>
+            </a:fillRef>
+            <a:effectRef idx="2">
+              <a:schemeClr val="accent5"/>
+            </a:effectRef>
+            <a:fontRef idx="minor">
+              <a:schemeClr val="lt1"/>
+            </a:fontRef>
+          </p:style>
+          <p:txBody>
+            <a:bodyPr vert="horz" wrap="square" lIns="0" tIns="0" rIns="0" bIns="0" numCol="1" rtlCol="0" anchor="ctr" anchorCtr="0" compatLnSpc="1">
+              <a:prstTxWarp prst="textNoShape">
+                <a:avLst/>
+              </a:prstTxWarp>
+              <a:noAutofit/>
+            </a:bodyPr>
+            <a:lstStyle/>
+            <a:p>
+              <a:pPr algn="ctr" defTabSz="1219170" fontAlgn="base">
+                <a:lnSpc>
+                  <a:spcPct val="90000"/>
+                </a:lnSpc>
+                <a:spcBef>
+                  <a:spcPct val="0"/>
+                </a:spcBef>
+                <a:spcAft>
+                  <a:spcPct val="0"/>
+                </a:spcAft>
+              </a:pPr>
+              <a:r>
+                <a:rPr lang="en-US" sz="1200" dirty="0">
+                  <a:solidFill>
+                    <a:schemeClr val="bg1"/>
+                  </a:solidFill>
+                </a:rPr>
+                <a:t>0</a:t>
+              </a:r>
+              <a:endParaRPr lang="en-US" sz="667" dirty="0">
+                <a:solidFill>
+                  <a:schemeClr val="bg1"/>
+                </a:solidFill>
+              </a:endParaRPr>
+            </a:p>
+          </p:txBody>
+        </p:sp>
+        <p:sp>
+          <p:nvSpPr>
+            <p:cNvPr id="64" name="Rounded Rectangle 63">
+              <a:extLst>
+                <a:ext uri="{FF2B5EF4-FFF2-40B4-BE49-F238E27FC236}">
+                  <a16:creationId xmlns:a16="http://schemas.microsoft.com/office/drawing/2014/main" id="{F82A6D44-ECD0-DD47-B9DD-C4D4CB3AD8EA}"/>
+                </a:ext>
+              </a:extLst>
+            </p:cNvPr>
+            <p:cNvSpPr/>
+            <p:nvPr/>
+          </p:nvSpPr>
+          <p:spPr bwMode="auto">
+            <a:xfrm>
+              <a:off x="3118877" y="4698127"/>
+              <a:ext cx="148586" cy="340835"/>
+            </a:xfrm>
+            <a:prstGeom prst="roundRect">
+              <a:avLst/>
+            </a:prstGeom>
+            <a:solidFill>
+              <a:schemeClr val="bg2"/>
+            </a:solidFill>
+            <a:ln>
+              <a:solidFill>
+                <a:schemeClr val="bg1"/>
+              </a:solidFill>
+              <a:prstDash val="solid"/>
+              <a:headEnd type="none" w="med" len="med"/>
+              <a:tailEnd type="none" w="med" len="med"/>
+            </a:ln>
+            <a:effectLst/>
+          </p:spPr>
+          <p:style>
+            <a:lnRef idx="1">
+              <a:schemeClr val="accent5"/>
+            </a:lnRef>
+            <a:fillRef idx="3">
+              <a:schemeClr val="accent5"/>
+            </a:fillRef>
+            <a:effectRef idx="2">
+              <a:schemeClr val="accent5"/>
+            </a:effectRef>
+            <a:fontRef idx="minor">
+              <a:schemeClr val="lt1"/>
+            </a:fontRef>
+          </p:style>
+          <p:txBody>
+            <a:bodyPr vert="horz" wrap="square" lIns="0" tIns="0" rIns="0" bIns="0" numCol="1" rtlCol="0" anchor="ctr" anchorCtr="0" compatLnSpc="1">
+              <a:prstTxWarp prst="textNoShape">
+                <a:avLst/>
+              </a:prstTxWarp>
+              <a:noAutofit/>
+            </a:bodyPr>
+            <a:lstStyle/>
+            <a:p>
+              <a:pPr algn="ctr" defTabSz="1219170" fontAlgn="base">
+                <a:lnSpc>
+                  <a:spcPct val="90000"/>
+                </a:lnSpc>
+                <a:spcBef>
+                  <a:spcPct val="0"/>
+                </a:spcBef>
+                <a:spcAft>
+                  <a:spcPct val="0"/>
+                </a:spcAft>
+              </a:pPr>
+              <a:r>
+                <a:rPr lang="en-US" sz="1200" dirty="0">
+                  <a:solidFill>
+                    <a:schemeClr val="bg1"/>
+                  </a:solidFill>
+                </a:rPr>
+                <a:t>1</a:t>
+              </a:r>
+              <a:endParaRPr lang="en-US" sz="667" dirty="0">
+                <a:solidFill>
+                  <a:schemeClr val="bg1"/>
+                </a:solidFill>
+              </a:endParaRPr>
+            </a:p>
+          </p:txBody>
+        </p:sp>
+        <p:sp>
+          <p:nvSpPr>
+            <p:cNvPr id="67" name="Rounded Rectangle 66">
+              <a:extLst>
+                <a:ext uri="{FF2B5EF4-FFF2-40B4-BE49-F238E27FC236}">
+                  <a16:creationId xmlns:a16="http://schemas.microsoft.com/office/drawing/2014/main" id="{AB9DB6C5-800F-0448-A1E5-36E45D11DCFB}"/>
+                </a:ext>
+              </a:extLst>
+            </p:cNvPr>
+            <p:cNvSpPr/>
+            <p:nvPr/>
+          </p:nvSpPr>
+          <p:spPr bwMode="auto">
+            <a:xfrm>
+              <a:off x="3260305" y="4698127"/>
+              <a:ext cx="148586" cy="340835"/>
+            </a:xfrm>
+            <a:prstGeom prst="roundRect">
+              <a:avLst/>
+            </a:prstGeom>
+            <a:solidFill>
+              <a:schemeClr val="bg2"/>
+            </a:solidFill>
+            <a:ln>
+              <a:solidFill>
+                <a:schemeClr val="bg1"/>
+              </a:solidFill>
+              <a:prstDash val="solid"/>
+              <a:headEnd type="none" w="med" len="med"/>
+              <a:tailEnd type="none" w="med" len="med"/>
+            </a:ln>
+            <a:effectLst/>
+          </p:spPr>
+          <p:style>
+            <a:lnRef idx="1">
+              <a:schemeClr val="accent5"/>
+            </a:lnRef>
+            <a:fillRef idx="3">
+              <a:schemeClr val="accent5"/>
+            </a:fillRef>
+            <a:effectRef idx="2">
+              <a:schemeClr val="accent5"/>
+            </a:effectRef>
+            <a:fontRef idx="minor">
+              <a:schemeClr val="lt1"/>
+            </a:fontRef>
+          </p:style>
+          <p:txBody>
+            <a:bodyPr vert="horz" wrap="square" lIns="0" tIns="0" rIns="0" bIns="0" numCol="1" rtlCol="0" anchor="ctr" anchorCtr="0" compatLnSpc="1">
+              <a:prstTxWarp prst="textNoShape">
+                <a:avLst/>
+              </a:prstTxWarp>
+              <a:noAutofit/>
+            </a:bodyPr>
+            <a:lstStyle/>
+            <a:p>
+              <a:pPr algn="ctr" defTabSz="1219170" fontAlgn="base">
+                <a:lnSpc>
+                  <a:spcPct val="90000"/>
+                </a:lnSpc>
+                <a:spcBef>
+                  <a:spcPct val="0"/>
+                </a:spcBef>
+                <a:spcAft>
+                  <a:spcPct val="0"/>
+                </a:spcAft>
+              </a:pPr>
+              <a:r>
+                <a:rPr lang="en-US" sz="1200" dirty="0">
+                  <a:solidFill>
+                    <a:schemeClr val="bg1"/>
+                  </a:solidFill>
+                </a:rPr>
+                <a:t>2</a:t>
+              </a:r>
+              <a:endParaRPr lang="en-US" sz="667" dirty="0">
+                <a:solidFill>
+                  <a:schemeClr val="bg1"/>
+                </a:solidFill>
+              </a:endParaRPr>
+            </a:p>
+          </p:txBody>
+        </p:sp>
+        <p:sp>
+          <p:nvSpPr>
+            <p:cNvPr id="71" name="TextBox 70">
+              <a:extLst>
+                <a:ext uri="{FF2B5EF4-FFF2-40B4-BE49-F238E27FC236}">
+                  <a16:creationId xmlns:a16="http://schemas.microsoft.com/office/drawing/2014/main" id="{FDB57912-4311-494B-B18F-140683CDF173}"/>
+                </a:ext>
+              </a:extLst>
+            </p:cNvPr>
+            <p:cNvSpPr txBox="1"/>
+            <p:nvPr/>
+          </p:nvSpPr>
+          <p:spPr>
+            <a:xfrm>
+              <a:off x="2943190" y="4391413"/>
+              <a:ext cx="732893" cy="246221"/>
+            </a:xfrm>
+            <a:prstGeom prst="rect">
+              <a:avLst/>
+            </a:prstGeom>
+            <a:noFill/>
+          </p:spPr>
+          <p:txBody>
+            <a:bodyPr wrap="square" rtlCol="0">
+              <a:spAutoFit/>
+            </a:bodyPr>
+            <a:lstStyle/>
+            <a:p>
+              <a:r>
+                <a:rPr lang="en-US" sz="1000" dirty="0">
+                  <a:solidFill>
+                    <a:schemeClr val="accent1">
+                      <a:lumMod val="25000"/>
+                    </a:schemeClr>
+                  </a:solidFill>
+                </a:rPr>
+                <a:t>orders</a:t>
+              </a:r>
+            </a:p>
+          </p:txBody>
+        </p:sp>
+      </p:grpSp>
+      <p:cxnSp>
+        <p:nvCxnSpPr>
+          <p:cNvPr id="72" name="Straight Connector 71">
+            <a:extLst>
+              <a:ext uri="{FF2B5EF4-FFF2-40B4-BE49-F238E27FC236}">
+                <a16:creationId xmlns:a16="http://schemas.microsoft.com/office/drawing/2014/main" id="{4E532F80-2994-BB45-8C88-0174ADC98339}"/>
+              </a:ext>
+            </a:extLst>
+          </p:cNvPr>
+          <p:cNvCxnSpPr>
+            <a:cxnSpLocks/>
+          </p:cNvCxnSpPr>
+          <p:nvPr/>
+        </p:nvCxnSpPr>
+        <p:spPr>
+          <a:xfrm>
+            <a:off x="11247333" y="1352714"/>
+            <a:ext cx="61379" cy="4917534"/>
+          </a:xfrm>
+          <a:prstGeom prst="line">
+            <a:avLst/>
+          </a:prstGeom>
+          <a:ln>
+            <a:solidFill>
+              <a:schemeClr val="accent1"/>
+            </a:solidFill>
+            <a:prstDash val="sysDot"/>
+          </a:ln>
+          <a:effectLst/>
+        </p:spPr>
+        <p:style>
+          <a:lnRef idx="2">
+            <a:schemeClr val="accent1"/>
+          </a:lnRef>
+          <a:fillRef idx="0">
+            <a:schemeClr val="accent1"/>
+          </a:fillRef>
+          <a:effectRef idx="1">
+            <a:schemeClr val="accent1"/>
+          </a:effectRef>
+          <a:fontRef idx="minor">
+            <a:schemeClr val="tx1"/>
+          </a:fontRef>
+        </p:style>
+      </p:cxnSp>
+      <p:cxnSp>
+        <p:nvCxnSpPr>
+          <p:cNvPr id="73" name="Straight Connector 72">
+            <a:extLst>
+              <a:ext uri="{FF2B5EF4-FFF2-40B4-BE49-F238E27FC236}">
+                <a16:creationId xmlns:a16="http://schemas.microsoft.com/office/drawing/2014/main" id="{B713245F-93D0-DC4C-84F6-F481396B3356}"/>
+              </a:ext>
+            </a:extLst>
+          </p:cNvPr>
+          <p:cNvCxnSpPr>
+            <a:cxnSpLocks/>
+          </p:cNvCxnSpPr>
+          <p:nvPr/>
+        </p:nvCxnSpPr>
+        <p:spPr>
+          <a:xfrm>
+            <a:off x="3867056" y="1450362"/>
+            <a:ext cx="67" cy="4839580"/>
+          </a:xfrm>
+          <a:prstGeom prst="line">
+            <a:avLst/>
+          </a:prstGeom>
+          <a:ln>
+            <a:solidFill>
+              <a:schemeClr val="accent1"/>
+            </a:solidFill>
+            <a:prstDash val="solid"/>
+          </a:ln>
+          <a:effectLst/>
+        </p:spPr>
+        <p:style>
+          <a:lnRef idx="2">
+            <a:schemeClr val="accent1"/>
+          </a:lnRef>
+          <a:fillRef idx="0">
+            <a:schemeClr val="accent1"/>
+          </a:fillRef>
+          <a:effectRef idx="1">
+            <a:schemeClr val="accent1"/>
+          </a:effectRef>
+          <a:fontRef idx="minor">
+            <a:schemeClr val="tx1"/>
+          </a:fontRef>
+        </p:style>
+      </p:cxnSp>
+      <p:cxnSp>
+        <p:nvCxnSpPr>
+          <p:cNvPr id="74" name="Straight Connector 73">
+            <a:extLst>
+              <a:ext uri="{FF2B5EF4-FFF2-40B4-BE49-F238E27FC236}">
+                <a16:creationId xmlns:a16="http://schemas.microsoft.com/office/drawing/2014/main" id="{20ED7CC8-E713-A44D-80C6-DACE470ADE31}"/>
+              </a:ext>
+            </a:extLst>
+          </p:cNvPr>
+          <p:cNvCxnSpPr>
+            <a:cxnSpLocks/>
+          </p:cNvCxnSpPr>
+          <p:nvPr/>
+        </p:nvCxnSpPr>
+        <p:spPr>
+          <a:xfrm>
+            <a:off x="4758579" y="1422194"/>
+            <a:ext cx="67" cy="4839580"/>
+          </a:xfrm>
+          <a:prstGeom prst="line">
+            <a:avLst/>
+          </a:prstGeom>
+          <a:ln>
+            <a:solidFill>
+              <a:schemeClr val="accent1"/>
+            </a:solidFill>
+            <a:prstDash val="sysDot"/>
+          </a:ln>
+          <a:effectLst/>
+        </p:spPr>
+        <p:style>
+          <a:lnRef idx="2">
+            <a:schemeClr val="accent1"/>
+          </a:lnRef>
+          <a:fillRef idx="0">
+            <a:schemeClr val="accent1"/>
+          </a:fillRef>
+          <a:effectRef idx="1">
+            <a:schemeClr val="accent1"/>
+          </a:effectRef>
+          <a:fontRef idx="minor">
+            <a:schemeClr val="tx1"/>
+          </a:fontRef>
+        </p:style>
+      </p:cxnSp>
+      <p:cxnSp>
+        <p:nvCxnSpPr>
+          <p:cNvPr id="75" name="Straight Connector 74">
+            <a:extLst>
+              <a:ext uri="{FF2B5EF4-FFF2-40B4-BE49-F238E27FC236}">
+                <a16:creationId xmlns:a16="http://schemas.microsoft.com/office/drawing/2014/main" id="{16697C94-E47B-CC4A-92F4-03CBA7E083C1}"/>
+              </a:ext>
+            </a:extLst>
+          </p:cNvPr>
+          <p:cNvCxnSpPr>
+            <a:cxnSpLocks/>
+          </p:cNvCxnSpPr>
+          <p:nvPr/>
+        </p:nvCxnSpPr>
+        <p:spPr>
+          <a:xfrm>
+            <a:off x="5774048" y="1442165"/>
+            <a:ext cx="67" cy="4839580"/>
+          </a:xfrm>
+          <a:prstGeom prst="line">
+            <a:avLst/>
+          </a:prstGeom>
+          <a:ln>
+            <a:solidFill>
+              <a:schemeClr val="accent1"/>
+            </a:solidFill>
+            <a:prstDash val="sysDot"/>
+          </a:ln>
+          <a:effectLst/>
+        </p:spPr>
+        <p:style>
+          <a:lnRef idx="2">
+            <a:schemeClr val="accent1"/>
+          </a:lnRef>
+          <a:fillRef idx="0">
+            <a:schemeClr val="accent1"/>
+          </a:fillRef>
+          <a:effectRef idx="1">
+            <a:schemeClr val="accent1"/>
+          </a:effectRef>
+          <a:fontRef idx="minor">
+            <a:schemeClr val="tx1"/>
+          </a:fontRef>
+        </p:style>
+      </p:cxnSp>
+      <p:sp>
+        <p:nvSpPr>
+          <p:cNvPr id="19" name="Rectangle 18">
+            <a:extLst>
+              <a:ext uri="{FF2B5EF4-FFF2-40B4-BE49-F238E27FC236}">
+                <a16:creationId xmlns:a16="http://schemas.microsoft.com/office/drawing/2014/main" id="{E3A14DE4-1686-F643-BC1D-E589E0FAA372}"/>
+              </a:ext>
+            </a:extLst>
+          </p:cNvPr>
+          <p:cNvSpPr/>
+          <p:nvPr/>
+        </p:nvSpPr>
+        <p:spPr>
+          <a:xfrm>
+            <a:off x="1571451" y="3747551"/>
+            <a:ext cx="1287532" cy="230832"/>
+          </a:xfrm>
+          <a:prstGeom prst="rect">
+            <a:avLst/>
+          </a:prstGeom>
+        </p:spPr>
+        <p:txBody>
+          <a:bodyPr wrap="none">
+            <a:spAutoFit/>
+          </a:bodyPr>
+          <a:lstStyle/>
+          <a:p>
+            <a:pPr algn="ctr"/>
+            <a:r>
+              <a:rPr lang="en-US" sz="900" dirty="0">
+                <a:solidFill>
+                  <a:schemeClr val="tx1">
+                    <a:lumMod val="50000"/>
+                  </a:schemeClr>
+                </a:solidFill>
+                <a:latin typeface="Menlo" panose="020B0609030804020204" pitchFamily="49" charset="0"/>
+              </a:rPr>
+              <a:t>Enable BPM (API)</a:t>
+            </a:r>
+            <a:endParaRPr lang="en-US" sz="900" b="0" dirty="0">
+              <a:solidFill>
+                <a:schemeClr val="tx1">
+                  <a:lumMod val="50000"/>
+                </a:schemeClr>
+              </a:solidFill>
+              <a:effectLst/>
+              <a:latin typeface="Menlo" panose="020B0609030804020204" pitchFamily="49" charset="0"/>
+            </a:endParaRPr>
+          </a:p>
+        </p:txBody>
+      </p:sp>
+      <p:cxnSp>
+        <p:nvCxnSpPr>
+          <p:cNvPr id="37" name="Straight Arrow Connector 36">
+            <a:extLst>
+              <a:ext uri="{FF2B5EF4-FFF2-40B4-BE49-F238E27FC236}">
+                <a16:creationId xmlns:a16="http://schemas.microsoft.com/office/drawing/2014/main" id="{232E98DE-D6C7-4E4D-A417-F51E37B94235}"/>
+              </a:ext>
+            </a:extLst>
+          </p:cNvPr>
+          <p:cNvCxnSpPr>
+            <a:cxnSpLocks/>
+          </p:cNvCxnSpPr>
+          <p:nvPr/>
+        </p:nvCxnSpPr>
+        <p:spPr>
+          <a:xfrm flipV="1">
+            <a:off x="1280097" y="4116883"/>
+            <a:ext cx="8759549" cy="13494"/>
+          </a:xfrm>
+          <a:prstGeom prst="straightConnector1">
+            <a:avLst/>
+          </a:prstGeom>
+          <a:ln>
+            <a:tailEnd type="triangle"/>
+          </a:ln>
+        </p:spPr>
+        <p:style>
+          <a:lnRef idx="1">
+            <a:schemeClr val="accent1"/>
+          </a:lnRef>
+          <a:fillRef idx="0">
+            <a:schemeClr val="accent1"/>
+          </a:fillRef>
+          <a:effectRef idx="0">
+            <a:schemeClr val="accent1"/>
+          </a:effectRef>
+          <a:fontRef idx="minor">
+            <a:schemeClr val="tx1"/>
+          </a:fontRef>
+        </p:style>
+      </p:cxnSp>
+      <p:sp>
+        <p:nvSpPr>
+          <p:cNvPr id="79" name="Rectangle 78">
+            <a:extLst>
+              <a:ext uri="{FF2B5EF4-FFF2-40B4-BE49-F238E27FC236}">
+                <a16:creationId xmlns:a16="http://schemas.microsoft.com/office/drawing/2014/main" id="{41ED11A4-B225-4C4B-AF38-F248234EE8F2}"/>
+              </a:ext>
+            </a:extLst>
+          </p:cNvPr>
+          <p:cNvSpPr/>
+          <p:nvPr/>
+        </p:nvSpPr>
+        <p:spPr>
+          <a:xfrm>
+            <a:off x="1742319" y="1967698"/>
+            <a:ext cx="1563249" cy="230832"/>
+          </a:xfrm>
+          <a:prstGeom prst="rect">
+            <a:avLst/>
+          </a:prstGeom>
+        </p:spPr>
+        <p:txBody>
+          <a:bodyPr wrap="none">
+            <a:spAutoFit/>
+          </a:bodyPr>
+          <a:lstStyle/>
+          <a:p>
+            <a:pPr algn="ctr"/>
+            <a:r>
+              <a:rPr lang="en-US" sz="900" b="0" dirty="0">
+                <a:solidFill>
+                  <a:schemeClr val="tx1">
+                    <a:lumMod val="50000"/>
+                  </a:schemeClr>
+                </a:solidFill>
+                <a:effectLst/>
+                <a:latin typeface="Menlo" panose="020B0609030804020204" pitchFamily="49" charset="0"/>
+              </a:rPr>
+              <a:t>Get BPM status (API)</a:t>
+            </a:r>
+          </a:p>
+        </p:txBody>
+      </p:sp>
+      <p:cxnSp>
+        <p:nvCxnSpPr>
+          <p:cNvPr id="93" name="Straight Arrow Connector 92">
+            <a:extLst>
+              <a:ext uri="{FF2B5EF4-FFF2-40B4-BE49-F238E27FC236}">
+                <a16:creationId xmlns:a16="http://schemas.microsoft.com/office/drawing/2014/main" id="{CA1C6312-F6B7-5340-9ABC-F8AFE8C86570}"/>
+              </a:ext>
+            </a:extLst>
+          </p:cNvPr>
+          <p:cNvCxnSpPr>
+            <a:cxnSpLocks/>
+          </p:cNvCxnSpPr>
+          <p:nvPr/>
+        </p:nvCxnSpPr>
+        <p:spPr>
+          <a:xfrm>
+            <a:off x="1262834" y="2301071"/>
+            <a:ext cx="8743722" cy="0"/>
+          </a:xfrm>
+          <a:prstGeom prst="straightConnector1">
+            <a:avLst/>
+          </a:prstGeom>
+          <a:ln>
+            <a:headEnd type="triangle"/>
+            <a:tailEnd type="none"/>
+          </a:ln>
+        </p:spPr>
+        <p:style>
+          <a:lnRef idx="1">
+            <a:schemeClr val="accent1"/>
+          </a:lnRef>
+          <a:fillRef idx="0">
+            <a:schemeClr val="accent1"/>
+          </a:fillRef>
+          <a:effectRef idx="0">
+            <a:schemeClr val="accent1"/>
+          </a:effectRef>
+          <a:fontRef idx="minor">
+            <a:schemeClr val="tx1"/>
+          </a:fontRef>
+        </p:style>
+      </p:cxnSp>
+      <p:sp>
+        <p:nvSpPr>
+          <p:cNvPr id="62" name="Rectangle 61">
+            <a:extLst>
+              <a:ext uri="{FF2B5EF4-FFF2-40B4-BE49-F238E27FC236}">
+                <a16:creationId xmlns:a16="http://schemas.microsoft.com/office/drawing/2014/main" id="{43104729-30AB-2A4A-AF04-5C650C91451E}"/>
+              </a:ext>
+            </a:extLst>
+          </p:cNvPr>
+          <p:cNvSpPr/>
+          <p:nvPr/>
+        </p:nvSpPr>
+        <p:spPr>
+          <a:xfrm>
+            <a:off x="1419156" y="2758172"/>
+            <a:ext cx="2183611" cy="230832"/>
+          </a:xfrm>
+          <a:prstGeom prst="rect">
+            <a:avLst/>
+          </a:prstGeom>
+        </p:spPr>
+        <p:txBody>
+          <a:bodyPr wrap="none">
+            <a:spAutoFit/>
+          </a:bodyPr>
+          <a:lstStyle/>
+          <a:p>
+            <a:pPr algn="ctr"/>
+            <a:r>
+              <a:rPr lang="en-US" sz="900" b="0" dirty="0">
+                <a:solidFill>
+                  <a:schemeClr val="tx1">
+                    <a:lumMod val="50000"/>
+                  </a:schemeClr>
+                </a:solidFill>
+                <a:effectLst/>
+                <a:latin typeface="Menlo" panose="020B0609030804020204" pitchFamily="49" charset="0"/>
+              </a:rPr>
+              <a:t>Verify BPM status is disabled</a:t>
+            </a:r>
+          </a:p>
+        </p:txBody>
+      </p:sp>
+      <p:sp>
+        <p:nvSpPr>
+          <p:cNvPr id="45" name="Rounded Rectangle 44">
+            <a:extLst>
+              <a:ext uri="{FF2B5EF4-FFF2-40B4-BE49-F238E27FC236}">
+                <a16:creationId xmlns:a16="http://schemas.microsoft.com/office/drawing/2014/main" id="{11120156-81C3-3A43-9203-249F234F16EE}"/>
+              </a:ext>
+            </a:extLst>
+          </p:cNvPr>
+          <p:cNvSpPr/>
+          <p:nvPr/>
+        </p:nvSpPr>
+        <p:spPr>
+          <a:xfrm>
+            <a:off x="1195842" y="2570459"/>
+            <a:ext cx="173522" cy="605750"/>
+          </a:xfrm>
+          <a:prstGeom prst="roundRect">
+            <a:avLst/>
+          </a:prstGeom>
+          <a:solidFill>
+            <a:schemeClr val="accent4">
+              <a:lumMod val="20000"/>
+              <a:lumOff val="80000"/>
+            </a:schemeClr>
+          </a:solidFill>
+        </p:spPr>
+        <p:style>
+          <a:lnRef idx="2">
+            <a:schemeClr val="accent1">
+              <a:shade val="50000"/>
+            </a:schemeClr>
+          </a:lnRef>
+          <a:fillRef idx="1">
+            <a:schemeClr val="accent1"/>
+          </a:fillRef>
+          <a:effectRef idx="0">
+            <a:schemeClr val="accent1"/>
+          </a:effectRef>
+          <a:fontRef idx="minor">
+            <a:schemeClr val="lt1"/>
+          </a:fontRef>
+        </p:style>
+        <p:txBody>
+          <a:bodyPr rtlCol="0" anchor="ctr"/>
+          <a:lstStyle/>
+          <a:p>
+            <a:pPr algn="ctr"/>
+            <a:endParaRPr lang="en-US"/>
+          </a:p>
+        </p:txBody>
+      </p:sp>
+      <p:sp>
+        <p:nvSpPr>
+          <p:cNvPr id="51" name="Rectangle 50">
+            <a:extLst>
+              <a:ext uri="{FF2B5EF4-FFF2-40B4-BE49-F238E27FC236}">
+                <a16:creationId xmlns:a16="http://schemas.microsoft.com/office/drawing/2014/main" id="{1F94DF2E-FA7A-4141-B1C9-2D13F1ACE097}"/>
+              </a:ext>
+            </a:extLst>
+          </p:cNvPr>
+          <p:cNvSpPr/>
+          <p:nvPr/>
+        </p:nvSpPr>
+        <p:spPr>
+          <a:xfrm>
+            <a:off x="1453622" y="4850951"/>
+            <a:ext cx="2114682" cy="230832"/>
+          </a:xfrm>
+          <a:prstGeom prst="rect">
+            <a:avLst/>
+          </a:prstGeom>
+        </p:spPr>
+        <p:txBody>
+          <a:bodyPr wrap="none">
+            <a:spAutoFit/>
+          </a:bodyPr>
+          <a:lstStyle/>
+          <a:p>
+            <a:pPr algn="ctr"/>
+            <a:r>
+              <a:rPr lang="en-US" sz="900" b="0" dirty="0">
+                <a:solidFill>
+                  <a:schemeClr val="tx1">
+                    <a:lumMod val="50000"/>
+                  </a:schemeClr>
+                </a:solidFill>
+                <a:effectLst/>
+                <a:latin typeface="Menlo" panose="020B0609030804020204" pitchFamily="49" charset="0"/>
+              </a:rPr>
+              <a:t>Verify BPM status </a:t>
+            </a:r>
+            <a:r>
+              <a:rPr lang="en-US" sz="900" b="0">
+                <a:solidFill>
+                  <a:schemeClr val="tx1">
+                    <a:lumMod val="50000"/>
+                  </a:schemeClr>
+                </a:solidFill>
+                <a:effectLst/>
+                <a:latin typeface="Menlo" panose="020B0609030804020204" pitchFamily="49" charset="0"/>
+              </a:rPr>
+              <a:t>is enabled</a:t>
+            </a:r>
+            <a:endParaRPr lang="en-US" sz="900" b="0" dirty="0">
+              <a:solidFill>
+                <a:schemeClr val="tx1">
+                  <a:lumMod val="50000"/>
+                </a:schemeClr>
+              </a:solidFill>
+              <a:effectLst/>
+              <a:latin typeface="Menlo" panose="020B0609030804020204" pitchFamily="49" charset="0"/>
+            </a:endParaRPr>
+          </a:p>
+        </p:txBody>
+      </p:sp>
+      <p:sp>
+        <p:nvSpPr>
+          <p:cNvPr id="53" name="Rounded Rectangle 52">
+            <a:extLst>
+              <a:ext uri="{FF2B5EF4-FFF2-40B4-BE49-F238E27FC236}">
+                <a16:creationId xmlns:a16="http://schemas.microsoft.com/office/drawing/2014/main" id="{29F8E24A-A85A-FB40-A029-1BCCD21F32D9}"/>
+              </a:ext>
+            </a:extLst>
+          </p:cNvPr>
+          <p:cNvSpPr/>
+          <p:nvPr/>
+        </p:nvSpPr>
+        <p:spPr>
+          <a:xfrm>
+            <a:off x="1195842" y="4663238"/>
+            <a:ext cx="173522" cy="605750"/>
+          </a:xfrm>
+          <a:prstGeom prst="roundRect">
+            <a:avLst/>
+          </a:prstGeom>
+          <a:solidFill>
+            <a:schemeClr val="accent4">
+              <a:lumMod val="20000"/>
+              <a:lumOff val="80000"/>
+            </a:schemeClr>
+          </a:solidFill>
+        </p:spPr>
+        <p:style>
+          <a:lnRef idx="2">
+            <a:schemeClr val="accent1">
+              <a:shade val="50000"/>
+            </a:schemeClr>
+          </a:lnRef>
+          <a:fillRef idx="1">
+            <a:schemeClr val="accent1"/>
+          </a:fillRef>
+          <a:effectRef idx="0">
+            <a:schemeClr val="accent1"/>
+          </a:effectRef>
+          <a:fontRef idx="minor">
+            <a:schemeClr val="lt1"/>
+          </a:fontRef>
+        </p:style>
+        <p:txBody>
+          <a:bodyPr rtlCol="0" anchor="ctr"/>
+          <a:lstStyle/>
+          <a:p>
+            <a:pPr algn="ctr"/>
+            <a:endParaRPr lang="en-US"/>
+          </a:p>
+        </p:txBody>
+      </p:sp>
+    </p:spTree>
+    <p:extLst>
+      <p:ext uri="{BB962C8B-B14F-4D97-AF65-F5344CB8AC3E}">
+        <p14:creationId xmlns:p14="http://schemas.microsoft.com/office/powerpoint/2010/main" val="1346963945"/>
+      </p:ext>
+    </p:extLst>
+  </p:cSld>
+  <p:clrMapOvr>
+    <a:masterClrMapping/>
+  </p:clrMapOvr>
+</p:sld>
+</file>
+
 <file path=ppt/slides/slide2.xml><?xml version="1.0" encoding="utf-8"?>
+<p:sld xmlns:a="http://schemas.openxmlformats.org/drawingml/2006/main" xmlns:r="http://schemas.openxmlformats.org/officeDocument/2006/relationships" xmlns:p="http://schemas.openxmlformats.org/presentationml/2006/main">
+  <p:cSld>
+    <p:spTree>
+      <p:nvGrpSpPr>
+        <p:cNvPr id="1" name=""/>
+        <p:cNvGrpSpPr/>
+        <p:nvPr/>
+      </p:nvGrpSpPr>
+      <p:grpSpPr>
+        <a:xfrm>
+          <a:off x="0" y="0"/>
+          <a:ext cx="0" cy="0"/>
+          <a:chOff x="0" y="0"/>
+          <a:chExt cx="0" cy="0"/>
+        </a:xfrm>
+      </p:grpSpPr>
+      <p:sp>
+        <p:nvSpPr>
+          <p:cNvPr id="2" name="Title 1">
+            <a:extLst>
+              <a:ext uri="{FF2B5EF4-FFF2-40B4-BE49-F238E27FC236}">
+                <a16:creationId xmlns:a16="http://schemas.microsoft.com/office/drawing/2014/main" id="{C2DC263B-64E3-534F-883E-DA4B2E433FAC}"/>
+              </a:ext>
+            </a:extLst>
+          </p:cNvPr>
+          <p:cNvSpPr>
+            <a:spLocks noGrp="1"/>
+          </p:cNvSpPr>
+          <p:nvPr>
+            <p:ph type="title"/>
+          </p:nvPr>
+        </p:nvSpPr>
+        <p:spPr>
+          <a:xfrm>
+            <a:off x="390788" y="60120"/>
+            <a:ext cx="10886813" cy="479167"/>
+          </a:xfrm>
+        </p:spPr>
+        <p:txBody>
+          <a:bodyPr anchor="ctr">
+            <a:noAutofit/>
+          </a:bodyPr>
+          <a:lstStyle/>
+          <a:p>
+            <a:r>
+              <a:rPr lang="en-US" sz="3600" dirty="0"/>
+              <a:t>Sequence Diagram </a:t>
+            </a:r>
+            <a:r>
+              <a:rPr lang="en-US" sz="2000" dirty="0"/>
+              <a:t>– [Test] : Disable BPM</a:t>
+            </a:r>
+          </a:p>
+        </p:txBody>
+      </p:sp>
+      <p:sp>
+        <p:nvSpPr>
+          <p:cNvPr id="5" name="Rounded Rectangle 4">
+            <a:extLst>
+              <a:ext uri="{FF2B5EF4-FFF2-40B4-BE49-F238E27FC236}">
+                <a16:creationId xmlns:a16="http://schemas.microsoft.com/office/drawing/2014/main" id="{6376851D-EB30-EC40-9684-727591A0F50B}"/>
+              </a:ext>
+            </a:extLst>
+          </p:cNvPr>
+          <p:cNvSpPr/>
+          <p:nvPr/>
+        </p:nvSpPr>
+        <p:spPr>
+          <a:xfrm>
+            <a:off x="675598" y="685132"/>
+            <a:ext cx="1239127" cy="619013"/>
+          </a:xfrm>
+          <a:prstGeom prst="roundRect">
+            <a:avLst/>
+          </a:prstGeom>
+          <a:solidFill>
+            <a:srgbClr val="CD8E7F"/>
+          </a:solidFill>
+          <a:ln>
+            <a:noFill/>
+          </a:ln>
+        </p:spPr>
+        <p:style>
+          <a:lnRef idx="2">
+            <a:schemeClr val="accent1">
+              <a:shade val="50000"/>
+            </a:schemeClr>
+          </a:lnRef>
+          <a:fillRef idx="1">
+            <a:schemeClr val="accent1"/>
+          </a:fillRef>
+          <a:effectRef idx="0">
+            <a:schemeClr val="accent1"/>
+          </a:effectRef>
+          <a:fontRef idx="minor">
+            <a:schemeClr val="lt1"/>
+          </a:fontRef>
+        </p:style>
+        <p:txBody>
+          <a:bodyPr rtlCol="0" anchor="ctr"/>
+          <a:lstStyle/>
+          <a:p>
+            <a:pPr algn="ctr"/>
+            <a:r>
+              <a:rPr lang="en-US" sz="1200" dirty="0"/>
+              <a:t>Container Anomaly Test</a:t>
+            </a:r>
+          </a:p>
+        </p:txBody>
+      </p:sp>
+      <p:sp>
+        <p:nvSpPr>
+          <p:cNvPr id="6" name="Rounded Rectangle 5">
+            <a:extLst>
+              <a:ext uri="{FF2B5EF4-FFF2-40B4-BE49-F238E27FC236}">
+                <a16:creationId xmlns:a16="http://schemas.microsoft.com/office/drawing/2014/main" id="{B480FF3B-BB08-FB48-9A87-5E412FDDE3D2}"/>
+              </a:ext>
+            </a:extLst>
+          </p:cNvPr>
+          <p:cNvSpPr/>
+          <p:nvPr/>
+        </p:nvSpPr>
+        <p:spPr>
+          <a:xfrm>
+            <a:off x="10679640" y="656721"/>
+            <a:ext cx="1135385" cy="695993"/>
+          </a:xfrm>
+          <a:prstGeom prst="roundRect">
+            <a:avLst/>
+          </a:prstGeom>
+          <a:solidFill>
+            <a:srgbClr val="CD8E7F"/>
+          </a:solidFill>
+          <a:ln>
+            <a:noFill/>
+          </a:ln>
+        </p:spPr>
+        <p:style>
+          <a:lnRef idx="2">
+            <a:schemeClr val="accent1">
+              <a:shade val="50000"/>
+            </a:schemeClr>
+          </a:lnRef>
+          <a:fillRef idx="1">
+            <a:schemeClr val="accent1"/>
+          </a:fillRef>
+          <a:effectRef idx="0">
+            <a:schemeClr val="accent1"/>
+          </a:effectRef>
+          <a:fontRef idx="minor">
+            <a:schemeClr val="lt1"/>
+          </a:fontRef>
+        </p:style>
+        <p:txBody>
+          <a:bodyPr rtlCol="0" anchor="ctr"/>
+          <a:lstStyle/>
+          <a:p>
+            <a:pPr algn="ctr"/>
+            <a:r>
+              <a:rPr lang="en-US" sz="1200" dirty="0"/>
+              <a:t>Voyages</a:t>
+            </a:r>
+          </a:p>
+        </p:txBody>
+      </p:sp>
+      <p:sp>
+        <p:nvSpPr>
+          <p:cNvPr id="7" name="Rounded Rectangle 6">
+            <a:extLst>
+              <a:ext uri="{FF2B5EF4-FFF2-40B4-BE49-F238E27FC236}">
+                <a16:creationId xmlns:a16="http://schemas.microsoft.com/office/drawing/2014/main" id="{8C6EB9B0-9301-CA48-9375-B174FEC3D319}"/>
+              </a:ext>
+            </a:extLst>
+          </p:cNvPr>
+          <p:cNvSpPr/>
+          <p:nvPr/>
+        </p:nvSpPr>
+        <p:spPr>
+          <a:xfrm>
+            <a:off x="8297249" y="656201"/>
+            <a:ext cx="999779" cy="688365"/>
+          </a:xfrm>
+          <a:prstGeom prst="roundRect">
+            <a:avLst/>
+          </a:prstGeom>
+          <a:solidFill>
+            <a:srgbClr val="CD8E7F"/>
+          </a:solidFill>
+          <a:ln>
+            <a:noFill/>
+          </a:ln>
+        </p:spPr>
+        <p:style>
+          <a:lnRef idx="2">
+            <a:schemeClr val="accent1">
+              <a:shade val="50000"/>
+            </a:schemeClr>
+          </a:lnRef>
+          <a:fillRef idx="1">
+            <a:schemeClr val="accent1"/>
+          </a:fillRef>
+          <a:effectRef idx="0">
+            <a:schemeClr val="accent1"/>
+          </a:effectRef>
+          <a:fontRef idx="minor">
+            <a:schemeClr val="lt1"/>
+          </a:fontRef>
+        </p:style>
+        <p:txBody>
+          <a:bodyPr rtlCol="0" anchor="ctr"/>
+          <a:lstStyle/>
+          <a:p>
+            <a:pPr algn="ctr"/>
+            <a:r>
+              <a:rPr lang="en-US" sz="1200" dirty="0"/>
+              <a:t>Order Query</a:t>
+            </a:r>
+          </a:p>
+        </p:txBody>
+      </p:sp>
+      <p:cxnSp>
+        <p:nvCxnSpPr>
+          <p:cNvPr id="9" name="Straight Connector 8">
+            <a:extLst>
+              <a:ext uri="{FF2B5EF4-FFF2-40B4-BE49-F238E27FC236}">
+                <a16:creationId xmlns:a16="http://schemas.microsoft.com/office/drawing/2014/main" id="{FE101728-0F3D-5E48-BB92-85CCCC7E13AB}"/>
+              </a:ext>
+            </a:extLst>
+          </p:cNvPr>
+          <p:cNvCxnSpPr>
+            <a:cxnSpLocks/>
+          </p:cNvCxnSpPr>
+          <p:nvPr/>
+        </p:nvCxnSpPr>
+        <p:spPr>
+          <a:xfrm>
+            <a:off x="8797139" y="1344566"/>
+            <a:ext cx="46173" cy="4983720"/>
+          </a:xfrm>
+          <a:prstGeom prst="line">
+            <a:avLst/>
+          </a:prstGeom>
+          <a:ln>
+            <a:solidFill>
+              <a:schemeClr val="accent1"/>
+            </a:solidFill>
+            <a:prstDash val="sysDot"/>
+          </a:ln>
+          <a:effectLst/>
+        </p:spPr>
+        <p:style>
+          <a:lnRef idx="2">
+            <a:schemeClr val="accent1"/>
+          </a:lnRef>
+          <a:fillRef idx="0">
+            <a:schemeClr val="accent1"/>
+          </a:fillRef>
+          <a:effectRef idx="1">
+            <a:schemeClr val="accent1"/>
+          </a:effectRef>
+          <a:fontRef idx="minor">
+            <a:schemeClr val="tx1"/>
+          </a:fontRef>
+        </p:style>
+      </p:cxnSp>
+      <p:cxnSp>
+        <p:nvCxnSpPr>
+          <p:cNvPr id="13" name="Straight Connector 12">
+            <a:extLst>
+              <a:ext uri="{FF2B5EF4-FFF2-40B4-BE49-F238E27FC236}">
+                <a16:creationId xmlns:a16="http://schemas.microsoft.com/office/drawing/2014/main" id="{1BA52A56-9158-F348-ABC2-85CD52367453}"/>
+              </a:ext>
+            </a:extLst>
+          </p:cNvPr>
+          <p:cNvCxnSpPr>
+            <a:cxnSpLocks/>
+          </p:cNvCxnSpPr>
+          <p:nvPr/>
+        </p:nvCxnSpPr>
+        <p:spPr>
+          <a:xfrm>
+            <a:off x="1280097" y="1297580"/>
+            <a:ext cx="0" cy="4800022"/>
+          </a:xfrm>
+          <a:prstGeom prst="line">
+            <a:avLst/>
+          </a:prstGeom>
+          <a:ln>
+            <a:solidFill>
+              <a:schemeClr val="accent1"/>
+            </a:solidFill>
+          </a:ln>
+          <a:effectLst/>
+        </p:spPr>
+        <p:style>
+          <a:lnRef idx="2">
+            <a:schemeClr val="accent1"/>
+          </a:lnRef>
+          <a:fillRef idx="0">
+            <a:schemeClr val="accent1"/>
+          </a:fillRef>
+          <a:effectRef idx="1">
+            <a:schemeClr val="accent1"/>
+          </a:effectRef>
+          <a:fontRef idx="minor">
+            <a:schemeClr val="tx1"/>
+          </a:fontRef>
+        </p:style>
+      </p:cxnSp>
+      <p:grpSp>
+        <p:nvGrpSpPr>
+          <p:cNvPr id="3" name="Group 2">
+            <a:extLst>
+              <a:ext uri="{FF2B5EF4-FFF2-40B4-BE49-F238E27FC236}">
+                <a16:creationId xmlns:a16="http://schemas.microsoft.com/office/drawing/2014/main" id="{5678EE10-3436-A74C-B1D7-1748C2828578}"/>
+              </a:ext>
+            </a:extLst>
+          </p:cNvPr>
+          <p:cNvGrpSpPr/>
+          <p:nvPr/>
+        </p:nvGrpSpPr>
+        <p:grpSpPr>
+          <a:xfrm>
+            <a:off x="3519061" y="734840"/>
+            <a:ext cx="732893" cy="651507"/>
+            <a:chOff x="2818985" y="1424735"/>
+            <a:chExt cx="732893" cy="647549"/>
+          </a:xfrm>
+        </p:grpSpPr>
+        <p:sp>
+          <p:nvSpPr>
+            <p:cNvPr id="23" name="Rounded Rectangle 22">
+              <a:extLst>
+                <a:ext uri="{FF2B5EF4-FFF2-40B4-BE49-F238E27FC236}">
+                  <a16:creationId xmlns:a16="http://schemas.microsoft.com/office/drawing/2014/main" id="{3C0FBF09-2F78-3445-AACC-A4B17348D220}"/>
+                </a:ext>
+              </a:extLst>
+            </p:cNvPr>
+            <p:cNvSpPr/>
+            <p:nvPr/>
+          </p:nvSpPr>
+          <p:spPr bwMode="auto">
+            <a:xfrm>
+              <a:off x="2940343" y="1731449"/>
+              <a:ext cx="146861" cy="340835"/>
+            </a:xfrm>
+            <a:prstGeom prst="roundRect">
+              <a:avLst/>
+            </a:prstGeom>
+            <a:solidFill>
+              <a:schemeClr val="bg2"/>
+            </a:solidFill>
+            <a:ln>
+              <a:solidFill>
+                <a:schemeClr val="bg1"/>
+              </a:solidFill>
+              <a:prstDash val="solid"/>
+              <a:headEnd type="none" w="med" len="med"/>
+              <a:tailEnd type="none" w="med" len="med"/>
+            </a:ln>
+            <a:effectLst/>
+          </p:spPr>
+          <p:style>
+            <a:lnRef idx="1">
+              <a:schemeClr val="accent5"/>
+            </a:lnRef>
+            <a:fillRef idx="3">
+              <a:schemeClr val="accent5"/>
+            </a:fillRef>
+            <a:effectRef idx="2">
+              <a:schemeClr val="accent5"/>
+            </a:effectRef>
+            <a:fontRef idx="minor">
+              <a:schemeClr val="lt1"/>
+            </a:fontRef>
+          </p:style>
+          <p:txBody>
+            <a:bodyPr vert="horz" wrap="square" lIns="0" tIns="0" rIns="0" bIns="0" numCol="1" rtlCol="0" anchor="ctr" anchorCtr="0" compatLnSpc="1">
+              <a:prstTxWarp prst="textNoShape">
+                <a:avLst/>
+              </a:prstTxWarp>
+              <a:noAutofit/>
+            </a:bodyPr>
+            <a:lstStyle/>
+            <a:p>
+              <a:pPr algn="ctr" defTabSz="1219170" fontAlgn="base">
+                <a:lnSpc>
+                  <a:spcPct val="90000"/>
+                </a:lnSpc>
+                <a:spcBef>
+                  <a:spcPct val="0"/>
+                </a:spcBef>
+                <a:spcAft>
+                  <a:spcPct val="0"/>
+                </a:spcAft>
+              </a:pPr>
+              <a:r>
+                <a:rPr lang="en-US" sz="1200" dirty="0">
+                  <a:solidFill>
+                    <a:schemeClr val="bg1"/>
+                  </a:solidFill>
+                </a:rPr>
+                <a:t>0</a:t>
+              </a:r>
+              <a:endParaRPr lang="en-US" sz="667" dirty="0">
+                <a:solidFill>
+                  <a:schemeClr val="bg1"/>
+                </a:solidFill>
+              </a:endParaRPr>
+            </a:p>
+          </p:txBody>
+        </p:sp>
+        <p:sp>
+          <p:nvSpPr>
+            <p:cNvPr id="24" name="Rounded Rectangle 23">
+              <a:extLst>
+                <a:ext uri="{FF2B5EF4-FFF2-40B4-BE49-F238E27FC236}">
+                  <a16:creationId xmlns:a16="http://schemas.microsoft.com/office/drawing/2014/main" id="{EE64C7C1-2730-EF4C-B593-863E261A2DAC}"/>
+                </a:ext>
+              </a:extLst>
+            </p:cNvPr>
+            <p:cNvSpPr/>
+            <p:nvPr/>
+          </p:nvSpPr>
+          <p:spPr bwMode="auto">
+            <a:xfrm>
+              <a:off x="3095280" y="1731449"/>
+              <a:ext cx="148586" cy="340835"/>
+            </a:xfrm>
+            <a:prstGeom prst="roundRect">
+              <a:avLst/>
+            </a:prstGeom>
+            <a:solidFill>
+              <a:schemeClr val="bg2"/>
+            </a:solidFill>
+            <a:ln>
+              <a:solidFill>
+                <a:schemeClr val="bg1"/>
+              </a:solidFill>
+              <a:prstDash val="solid"/>
+              <a:headEnd type="none" w="med" len="med"/>
+              <a:tailEnd type="none" w="med" len="med"/>
+            </a:ln>
+            <a:effectLst/>
+          </p:spPr>
+          <p:style>
+            <a:lnRef idx="1">
+              <a:schemeClr val="accent5"/>
+            </a:lnRef>
+            <a:fillRef idx="3">
+              <a:schemeClr val="accent5"/>
+            </a:fillRef>
+            <a:effectRef idx="2">
+              <a:schemeClr val="accent5"/>
+            </a:effectRef>
+            <a:fontRef idx="minor">
+              <a:schemeClr val="lt1"/>
+            </a:fontRef>
+          </p:style>
+          <p:txBody>
+            <a:bodyPr vert="horz" wrap="square" lIns="0" tIns="0" rIns="0" bIns="0" numCol="1" rtlCol="0" anchor="ctr" anchorCtr="0" compatLnSpc="1">
+              <a:prstTxWarp prst="textNoShape">
+                <a:avLst/>
+              </a:prstTxWarp>
+              <a:noAutofit/>
+            </a:bodyPr>
+            <a:lstStyle/>
+            <a:p>
+              <a:pPr algn="ctr" defTabSz="1219170" fontAlgn="base">
+                <a:lnSpc>
+                  <a:spcPct val="90000"/>
+                </a:lnSpc>
+                <a:spcBef>
+                  <a:spcPct val="0"/>
+                </a:spcBef>
+                <a:spcAft>
+                  <a:spcPct val="0"/>
+                </a:spcAft>
+              </a:pPr>
+              <a:r>
+                <a:rPr lang="en-US" sz="1200" dirty="0">
+                  <a:solidFill>
+                    <a:schemeClr val="bg1"/>
+                  </a:solidFill>
+                </a:rPr>
+                <a:t>1</a:t>
+              </a:r>
+              <a:endParaRPr lang="en-US" sz="667" dirty="0">
+                <a:solidFill>
+                  <a:schemeClr val="bg1"/>
+                </a:solidFill>
+              </a:endParaRPr>
+            </a:p>
+          </p:txBody>
+        </p:sp>
+        <p:sp>
+          <p:nvSpPr>
+            <p:cNvPr id="25" name="Rounded Rectangle 24">
+              <a:extLst>
+                <a:ext uri="{FF2B5EF4-FFF2-40B4-BE49-F238E27FC236}">
+                  <a16:creationId xmlns:a16="http://schemas.microsoft.com/office/drawing/2014/main" id="{54D4C2F0-EAAD-3D44-A79B-E17107A7A12B}"/>
+                </a:ext>
+              </a:extLst>
+            </p:cNvPr>
+            <p:cNvSpPr/>
+            <p:nvPr/>
+          </p:nvSpPr>
+          <p:spPr bwMode="auto">
+            <a:xfrm>
+              <a:off x="3236708" y="1731449"/>
+              <a:ext cx="148586" cy="340835"/>
+            </a:xfrm>
+            <a:prstGeom prst="roundRect">
+              <a:avLst/>
+            </a:prstGeom>
+            <a:solidFill>
+              <a:schemeClr val="bg2"/>
+            </a:solidFill>
+            <a:ln>
+              <a:solidFill>
+                <a:schemeClr val="bg1"/>
+              </a:solidFill>
+              <a:prstDash val="solid"/>
+              <a:headEnd type="none" w="med" len="med"/>
+              <a:tailEnd type="none" w="med" len="med"/>
+            </a:ln>
+            <a:effectLst/>
+          </p:spPr>
+          <p:style>
+            <a:lnRef idx="1">
+              <a:schemeClr val="accent5"/>
+            </a:lnRef>
+            <a:fillRef idx="3">
+              <a:schemeClr val="accent5"/>
+            </a:fillRef>
+            <a:effectRef idx="2">
+              <a:schemeClr val="accent5"/>
+            </a:effectRef>
+            <a:fontRef idx="minor">
+              <a:schemeClr val="lt1"/>
+            </a:fontRef>
+          </p:style>
+          <p:txBody>
+            <a:bodyPr vert="horz" wrap="square" lIns="0" tIns="0" rIns="0" bIns="0" numCol="1" rtlCol="0" anchor="ctr" anchorCtr="0" compatLnSpc="1">
+              <a:prstTxWarp prst="textNoShape">
+                <a:avLst/>
+              </a:prstTxWarp>
+              <a:noAutofit/>
+            </a:bodyPr>
+            <a:lstStyle/>
+            <a:p>
+              <a:pPr algn="ctr" defTabSz="1219170" fontAlgn="base">
+                <a:lnSpc>
+                  <a:spcPct val="90000"/>
+                </a:lnSpc>
+                <a:spcBef>
+                  <a:spcPct val="0"/>
+                </a:spcBef>
+                <a:spcAft>
+                  <a:spcPct val="0"/>
+                </a:spcAft>
+              </a:pPr>
+              <a:r>
+                <a:rPr lang="en-US" sz="1200" dirty="0">
+                  <a:solidFill>
+                    <a:schemeClr val="bg1"/>
+                  </a:solidFill>
+                </a:rPr>
+                <a:t>2</a:t>
+              </a:r>
+              <a:endParaRPr lang="en-US" sz="667" dirty="0">
+                <a:solidFill>
+                  <a:schemeClr val="bg1"/>
+                </a:solidFill>
+              </a:endParaRPr>
+            </a:p>
+          </p:txBody>
+        </p:sp>
+        <p:sp>
+          <p:nvSpPr>
+            <p:cNvPr id="26" name="TextBox 25">
+              <a:extLst>
+                <a:ext uri="{FF2B5EF4-FFF2-40B4-BE49-F238E27FC236}">
+                  <a16:creationId xmlns:a16="http://schemas.microsoft.com/office/drawing/2014/main" id="{5F769FB6-E5B1-6C4C-A619-64ED4A003362}"/>
+                </a:ext>
+              </a:extLst>
+            </p:cNvPr>
+            <p:cNvSpPr txBox="1"/>
+            <p:nvPr/>
+          </p:nvSpPr>
+          <p:spPr>
+            <a:xfrm>
+              <a:off x="2818985" y="1424735"/>
+              <a:ext cx="732893" cy="246221"/>
+            </a:xfrm>
+            <a:prstGeom prst="rect">
+              <a:avLst/>
+            </a:prstGeom>
+            <a:noFill/>
+          </p:spPr>
+          <p:txBody>
+            <a:bodyPr wrap="none" rtlCol="0">
+              <a:spAutoFit/>
+            </a:bodyPr>
+            <a:lstStyle/>
+            <a:p>
+              <a:r>
+                <a:rPr lang="en-US" sz="1000" dirty="0">
+                  <a:solidFill>
+                    <a:schemeClr val="accent1">
+                      <a:lumMod val="25000"/>
+                    </a:schemeClr>
+                  </a:solidFill>
+                </a:rPr>
+                <a:t>containers</a:t>
+              </a:r>
+            </a:p>
+          </p:txBody>
+        </p:sp>
+      </p:grpSp>
+      <p:sp>
+        <p:nvSpPr>
+          <p:cNvPr id="27" name="AutoShape 4">
+            <a:extLst>
+              <a:ext uri="{FF2B5EF4-FFF2-40B4-BE49-F238E27FC236}">
+                <a16:creationId xmlns:a16="http://schemas.microsoft.com/office/drawing/2014/main" id="{6AF712C3-5319-A14C-871E-ED55D5BC2AFE}"/>
+              </a:ext>
+            </a:extLst>
+          </p:cNvPr>
+          <p:cNvSpPr>
+            <a:spLocks noChangeArrowheads="1"/>
+          </p:cNvSpPr>
+          <p:nvPr/>
+        </p:nvSpPr>
+        <p:spPr bwMode="auto">
+          <a:xfrm>
+            <a:off x="2246382" y="628690"/>
+            <a:ext cx="4377775" cy="899574"/>
+          </a:xfrm>
+          <a:prstGeom prst="roundRect">
+            <a:avLst>
+              <a:gd name="adj" fmla="val 7117"/>
+            </a:avLst>
+          </a:prstGeom>
+          <a:noFill/>
+          <a:ln w="12700">
+            <a:solidFill>
+              <a:srgbClr val="5596E6">
+                <a:lumMod val="50000"/>
+              </a:srgbClr>
+            </a:solidFill>
+            <a:prstDash val="dash"/>
+            <a:round/>
+            <a:headEnd/>
+            <a:tailEnd/>
+          </a:ln>
+        </p:spPr>
+        <p:txBody>
+          <a:bodyPr lIns="0" tIns="0" rIns="0" bIns="0" anchor="b" anchorCtr="1"/>
+          <a:lstStyle/>
+          <a:p>
+            <a:pPr algn="ctr" defTabSz="1219170" eaLnBrk="1" fontAlgn="auto" hangingPunct="1">
+              <a:spcBef>
+                <a:spcPts val="0"/>
+              </a:spcBef>
+              <a:spcAft>
+                <a:spcPts val="0"/>
+              </a:spcAft>
+              <a:defRPr/>
+            </a:pPr>
+            <a:endParaRPr lang="en-US" sz="1333" kern="0" dirty="0">
+              <a:solidFill>
+                <a:srgbClr val="6D7777"/>
+              </a:solidFill>
+            </a:endParaRPr>
+          </a:p>
+        </p:txBody>
+      </p:sp>
+      <p:pic>
+        <p:nvPicPr>
+          <p:cNvPr id="28" name="Picture 27">
+            <a:extLst>
+              <a:ext uri="{FF2B5EF4-FFF2-40B4-BE49-F238E27FC236}">
+                <a16:creationId xmlns:a16="http://schemas.microsoft.com/office/drawing/2014/main" id="{38AF52D8-AD34-D041-AD87-90558DC31D05}"/>
+              </a:ext>
+            </a:extLst>
+          </p:cNvPr>
+          <p:cNvPicPr>
+            <a:picLocks noChangeAspect="1"/>
+          </p:cNvPicPr>
+          <p:nvPr/>
+        </p:nvPicPr>
+        <p:blipFill>
+          <a:blip r:embed="rId2">
+            <a:biLevel thresh="75000"/>
+            <a:extLst>
+              <a:ext uri="{BEBA8EAE-BF5A-486C-A8C5-ECC9F3942E4B}">
+                <a14:imgProps xmlns:a14="http://schemas.microsoft.com/office/drawing/2010/main">
+                  <a14:imgLayer r:embed="rId3">
+                    <a14:imgEffect>
+                      <a14:artisticPhotocopy/>
+                    </a14:imgEffect>
+                  </a14:imgLayer>
+                </a14:imgProps>
+              </a:ext>
+              <a:ext uri="{28A0092B-C50C-407E-A947-70E740481C1C}">
+                <a14:useLocalDpi xmlns:a14="http://schemas.microsoft.com/office/drawing/2010/main" val="0"/>
+              </a:ext>
+            </a:extLst>
+          </a:blip>
+          <a:stretch>
+            <a:fillRect/>
+          </a:stretch>
+        </p:blipFill>
+        <p:spPr>
+          <a:xfrm>
+            <a:off x="2484268" y="826887"/>
+            <a:ext cx="959343" cy="504271"/>
+          </a:xfrm>
+          <a:prstGeom prst="rect">
+            <a:avLst/>
+          </a:prstGeom>
+        </p:spPr>
+      </p:pic>
+      <p:sp>
+        <p:nvSpPr>
+          <p:cNvPr id="29" name="Rounded Rectangle 28">
+            <a:extLst>
+              <a:ext uri="{FF2B5EF4-FFF2-40B4-BE49-F238E27FC236}">
+                <a16:creationId xmlns:a16="http://schemas.microsoft.com/office/drawing/2014/main" id="{523FB07B-7599-2D42-B589-69A302AEBE37}"/>
+              </a:ext>
+            </a:extLst>
+          </p:cNvPr>
+          <p:cNvSpPr/>
+          <p:nvPr/>
+        </p:nvSpPr>
+        <p:spPr>
+          <a:xfrm>
+            <a:off x="6927378" y="656200"/>
+            <a:ext cx="1159906" cy="688366"/>
+          </a:xfrm>
+          <a:prstGeom prst="roundRect">
+            <a:avLst/>
+          </a:prstGeom>
+          <a:solidFill>
+            <a:srgbClr val="CD8E7F"/>
+          </a:solidFill>
+          <a:ln>
+            <a:noFill/>
+          </a:ln>
+        </p:spPr>
+        <p:style>
+          <a:lnRef idx="2">
+            <a:schemeClr val="accent1">
+              <a:shade val="50000"/>
+            </a:schemeClr>
+          </a:lnRef>
+          <a:fillRef idx="1">
+            <a:schemeClr val="accent1"/>
+          </a:fillRef>
+          <a:effectRef idx="0">
+            <a:schemeClr val="accent1"/>
+          </a:effectRef>
+          <a:fontRef idx="minor">
+            <a:schemeClr val="lt1"/>
+          </a:fontRef>
+        </p:style>
+        <p:txBody>
+          <a:bodyPr rtlCol="0" anchor="ctr"/>
+          <a:lstStyle/>
+          <a:p>
+            <a:pPr algn="ctr"/>
+            <a:r>
+              <a:rPr lang="en-US" sz="1200" dirty="0"/>
+              <a:t>Order Command</a:t>
+            </a:r>
+          </a:p>
+        </p:txBody>
+      </p:sp>
+      <p:cxnSp>
+        <p:nvCxnSpPr>
+          <p:cNvPr id="30" name="Straight Connector 29">
+            <a:extLst>
+              <a:ext uri="{FF2B5EF4-FFF2-40B4-BE49-F238E27FC236}">
+                <a16:creationId xmlns:a16="http://schemas.microsoft.com/office/drawing/2014/main" id="{99107328-FE14-7247-BC64-DD094759DAC9}"/>
+              </a:ext>
+            </a:extLst>
+          </p:cNvPr>
+          <p:cNvCxnSpPr>
+            <a:cxnSpLocks/>
+          </p:cNvCxnSpPr>
+          <p:nvPr/>
+        </p:nvCxnSpPr>
+        <p:spPr>
+          <a:xfrm>
+            <a:off x="7507331" y="1344566"/>
+            <a:ext cx="67" cy="4839580"/>
+          </a:xfrm>
+          <a:prstGeom prst="line">
+            <a:avLst/>
+          </a:prstGeom>
+          <a:ln>
+            <a:solidFill>
+              <a:schemeClr val="accent1"/>
+            </a:solidFill>
+            <a:prstDash val="sysDot"/>
+          </a:ln>
+          <a:effectLst/>
+        </p:spPr>
+        <p:style>
+          <a:lnRef idx="2">
+            <a:schemeClr val="accent1"/>
+          </a:lnRef>
+          <a:fillRef idx="0">
+            <a:schemeClr val="accent1"/>
+          </a:fillRef>
+          <a:effectRef idx="1">
+            <a:schemeClr val="accent1"/>
+          </a:effectRef>
+          <a:fontRef idx="minor">
+            <a:schemeClr val="tx1"/>
+          </a:fontRef>
+        </p:style>
+      </p:cxnSp>
+      <p:sp>
+        <p:nvSpPr>
+          <p:cNvPr id="49" name="Rounded Rectangle 48">
+            <a:extLst>
+              <a:ext uri="{FF2B5EF4-FFF2-40B4-BE49-F238E27FC236}">
+                <a16:creationId xmlns:a16="http://schemas.microsoft.com/office/drawing/2014/main" id="{96A319E2-968D-9D44-98D1-D9F7D2A109F1}"/>
+              </a:ext>
+            </a:extLst>
+          </p:cNvPr>
+          <p:cNvSpPr/>
+          <p:nvPr/>
+        </p:nvSpPr>
+        <p:spPr>
+          <a:xfrm>
+            <a:off x="9506993" y="656200"/>
+            <a:ext cx="999125" cy="686482"/>
+          </a:xfrm>
+          <a:prstGeom prst="roundRect">
+            <a:avLst/>
+          </a:prstGeom>
+          <a:solidFill>
+            <a:srgbClr val="CD8E7F"/>
+          </a:solidFill>
+          <a:ln>
+            <a:noFill/>
+          </a:ln>
+        </p:spPr>
+        <p:style>
+          <a:lnRef idx="2">
+            <a:schemeClr val="accent1">
+              <a:shade val="50000"/>
+            </a:schemeClr>
+          </a:lnRef>
+          <a:fillRef idx="1">
+            <a:schemeClr val="accent1"/>
+          </a:fillRef>
+          <a:effectRef idx="0">
+            <a:schemeClr val="accent1"/>
+          </a:effectRef>
+          <a:fontRef idx="minor">
+            <a:schemeClr val="lt1"/>
+          </a:fontRef>
+        </p:style>
+        <p:txBody>
+          <a:bodyPr rtlCol="0" anchor="ctr"/>
+          <a:lstStyle/>
+          <a:p>
+            <a:pPr algn="ctr"/>
+            <a:r>
+              <a:rPr lang="en-US" sz="1200" dirty="0"/>
+              <a:t>Spring Containers</a:t>
+            </a:r>
+          </a:p>
+        </p:txBody>
+      </p:sp>
+      <p:cxnSp>
+        <p:nvCxnSpPr>
+          <p:cNvPr id="50" name="Straight Connector 49">
+            <a:extLst>
+              <a:ext uri="{FF2B5EF4-FFF2-40B4-BE49-F238E27FC236}">
+                <a16:creationId xmlns:a16="http://schemas.microsoft.com/office/drawing/2014/main" id="{82FA8B23-EDB8-A345-A190-D56010318D2D}"/>
+              </a:ext>
+            </a:extLst>
+          </p:cNvPr>
+          <p:cNvCxnSpPr>
+            <a:cxnSpLocks/>
+          </p:cNvCxnSpPr>
+          <p:nvPr/>
+        </p:nvCxnSpPr>
+        <p:spPr>
+          <a:xfrm>
+            <a:off x="10006556" y="1342682"/>
+            <a:ext cx="33090" cy="4841464"/>
+          </a:xfrm>
+          <a:prstGeom prst="line">
+            <a:avLst/>
+          </a:prstGeom>
+          <a:ln>
+            <a:solidFill>
+              <a:schemeClr val="accent1"/>
+            </a:solidFill>
+            <a:prstDash val="sysDot"/>
+          </a:ln>
+          <a:effectLst/>
+        </p:spPr>
+        <p:style>
+          <a:lnRef idx="2">
+            <a:schemeClr val="accent1"/>
+          </a:lnRef>
+          <a:fillRef idx="0">
+            <a:schemeClr val="accent1"/>
+          </a:fillRef>
+          <a:effectRef idx="1">
+            <a:schemeClr val="accent1"/>
+          </a:effectRef>
+          <a:fontRef idx="minor">
+            <a:schemeClr val="tx1"/>
+          </a:fontRef>
+        </p:style>
+      </p:cxnSp>
+      <p:grpSp>
+        <p:nvGrpSpPr>
+          <p:cNvPr id="18" name="Group 17">
+            <a:extLst>
+              <a:ext uri="{FF2B5EF4-FFF2-40B4-BE49-F238E27FC236}">
+                <a16:creationId xmlns:a16="http://schemas.microsoft.com/office/drawing/2014/main" id="{1203E6DB-0E57-AB47-8F57-BD657E3A8980}"/>
+              </a:ext>
+            </a:extLst>
+          </p:cNvPr>
+          <p:cNvGrpSpPr/>
+          <p:nvPr/>
+        </p:nvGrpSpPr>
+        <p:grpSpPr>
+          <a:xfrm>
+            <a:off x="4250518" y="720007"/>
+            <a:ext cx="1059906" cy="636766"/>
+            <a:chOff x="2649712" y="2855073"/>
+            <a:chExt cx="1059906" cy="636766"/>
+          </a:xfrm>
+        </p:grpSpPr>
+        <p:sp>
+          <p:nvSpPr>
+            <p:cNvPr id="47" name="Rounded Rectangle 46">
+              <a:extLst>
+                <a:ext uri="{FF2B5EF4-FFF2-40B4-BE49-F238E27FC236}">
+                  <a16:creationId xmlns:a16="http://schemas.microsoft.com/office/drawing/2014/main" id="{BC86C5F4-C329-7840-B977-3DF7C1B7A90E}"/>
+                </a:ext>
+              </a:extLst>
+            </p:cNvPr>
+            <p:cNvSpPr/>
+            <p:nvPr/>
+          </p:nvSpPr>
+          <p:spPr bwMode="auto">
+            <a:xfrm>
+              <a:off x="2932267" y="3151004"/>
+              <a:ext cx="146861" cy="340835"/>
+            </a:xfrm>
+            <a:prstGeom prst="roundRect">
+              <a:avLst/>
+            </a:prstGeom>
+            <a:solidFill>
+              <a:schemeClr val="bg2"/>
+            </a:solidFill>
+            <a:ln>
+              <a:solidFill>
+                <a:schemeClr val="bg1"/>
+              </a:solidFill>
+              <a:prstDash val="solid"/>
+              <a:headEnd type="none" w="med" len="med"/>
+              <a:tailEnd type="none" w="med" len="med"/>
+            </a:ln>
+            <a:effectLst/>
+          </p:spPr>
+          <p:style>
+            <a:lnRef idx="1">
+              <a:schemeClr val="accent5"/>
+            </a:lnRef>
+            <a:fillRef idx="3">
+              <a:schemeClr val="accent5"/>
+            </a:fillRef>
+            <a:effectRef idx="2">
+              <a:schemeClr val="accent5"/>
+            </a:effectRef>
+            <a:fontRef idx="minor">
+              <a:schemeClr val="lt1"/>
+            </a:fontRef>
+          </p:style>
+          <p:txBody>
+            <a:bodyPr vert="horz" wrap="square" lIns="0" tIns="0" rIns="0" bIns="0" numCol="1" rtlCol="0" anchor="ctr" anchorCtr="0" compatLnSpc="1">
+              <a:prstTxWarp prst="textNoShape">
+                <a:avLst/>
+              </a:prstTxWarp>
+              <a:noAutofit/>
+            </a:bodyPr>
+            <a:lstStyle/>
+            <a:p>
+              <a:pPr algn="ctr" defTabSz="1219170" fontAlgn="base">
+                <a:lnSpc>
+                  <a:spcPct val="90000"/>
+                </a:lnSpc>
+                <a:spcBef>
+                  <a:spcPct val="0"/>
+                </a:spcBef>
+                <a:spcAft>
+                  <a:spcPct val="0"/>
+                </a:spcAft>
+              </a:pPr>
+              <a:r>
+                <a:rPr lang="en-US" sz="1200" dirty="0">
+                  <a:solidFill>
+                    <a:schemeClr val="bg1"/>
+                  </a:solidFill>
+                </a:rPr>
+                <a:t>0</a:t>
+              </a:r>
+              <a:endParaRPr lang="en-US" sz="667" dirty="0">
+                <a:solidFill>
+                  <a:schemeClr val="bg1"/>
+                </a:solidFill>
+              </a:endParaRPr>
+            </a:p>
+          </p:txBody>
+        </p:sp>
+        <p:sp>
+          <p:nvSpPr>
+            <p:cNvPr id="48" name="Rounded Rectangle 47">
+              <a:extLst>
+                <a:ext uri="{FF2B5EF4-FFF2-40B4-BE49-F238E27FC236}">
+                  <a16:creationId xmlns:a16="http://schemas.microsoft.com/office/drawing/2014/main" id="{0486D77C-9BB1-0144-AFBD-B1CB441F90AD}"/>
+                </a:ext>
+              </a:extLst>
+            </p:cNvPr>
+            <p:cNvSpPr/>
+            <p:nvPr/>
+          </p:nvSpPr>
+          <p:spPr bwMode="auto">
+            <a:xfrm>
+              <a:off x="3087204" y="3151004"/>
+              <a:ext cx="148586" cy="340835"/>
+            </a:xfrm>
+            <a:prstGeom prst="roundRect">
+              <a:avLst/>
+            </a:prstGeom>
+            <a:solidFill>
+              <a:schemeClr val="bg2"/>
+            </a:solidFill>
+            <a:ln>
+              <a:solidFill>
+                <a:schemeClr val="bg1"/>
+              </a:solidFill>
+              <a:prstDash val="solid"/>
+              <a:headEnd type="none" w="med" len="med"/>
+              <a:tailEnd type="none" w="med" len="med"/>
+            </a:ln>
+            <a:effectLst/>
+          </p:spPr>
+          <p:style>
+            <a:lnRef idx="1">
+              <a:schemeClr val="accent5"/>
+            </a:lnRef>
+            <a:fillRef idx="3">
+              <a:schemeClr val="accent5"/>
+            </a:fillRef>
+            <a:effectRef idx="2">
+              <a:schemeClr val="accent5"/>
+            </a:effectRef>
+            <a:fontRef idx="minor">
+              <a:schemeClr val="lt1"/>
+            </a:fontRef>
+          </p:style>
+          <p:txBody>
+            <a:bodyPr vert="horz" wrap="square" lIns="0" tIns="0" rIns="0" bIns="0" numCol="1" rtlCol="0" anchor="ctr" anchorCtr="0" compatLnSpc="1">
+              <a:prstTxWarp prst="textNoShape">
+                <a:avLst/>
+              </a:prstTxWarp>
+              <a:noAutofit/>
+            </a:bodyPr>
+            <a:lstStyle/>
+            <a:p>
+              <a:pPr algn="ctr" defTabSz="1219170" fontAlgn="base">
+                <a:lnSpc>
+                  <a:spcPct val="90000"/>
+                </a:lnSpc>
+                <a:spcBef>
+                  <a:spcPct val="0"/>
+                </a:spcBef>
+                <a:spcAft>
+                  <a:spcPct val="0"/>
+                </a:spcAft>
+              </a:pPr>
+              <a:r>
+                <a:rPr lang="en-US" sz="1200" dirty="0">
+                  <a:solidFill>
+                    <a:schemeClr val="bg1"/>
+                  </a:solidFill>
+                </a:rPr>
+                <a:t>1</a:t>
+              </a:r>
+              <a:endParaRPr lang="en-US" sz="667" dirty="0">
+                <a:solidFill>
+                  <a:schemeClr val="bg1"/>
+                </a:solidFill>
+              </a:endParaRPr>
+            </a:p>
+          </p:txBody>
+        </p:sp>
+        <p:sp>
+          <p:nvSpPr>
+            <p:cNvPr id="52" name="Rounded Rectangle 51">
+              <a:extLst>
+                <a:ext uri="{FF2B5EF4-FFF2-40B4-BE49-F238E27FC236}">
+                  <a16:creationId xmlns:a16="http://schemas.microsoft.com/office/drawing/2014/main" id="{50F8C2AC-E7E9-D345-BBFC-553A27989074}"/>
+                </a:ext>
+              </a:extLst>
+            </p:cNvPr>
+            <p:cNvSpPr/>
+            <p:nvPr/>
+          </p:nvSpPr>
+          <p:spPr bwMode="auto">
+            <a:xfrm>
+              <a:off x="3228632" y="3151004"/>
+              <a:ext cx="148586" cy="340835"/>
+            </a:xfrm>
+            <a:prstGeom prst="roundRect">
+              <a:avLst/>
+            </a:prstGeom>
+            <a:solidFill>
+              <a:schemeClr val="bg2"/>
+            </a:solidFill>
+            <a:ln>
+              <a:solidFill>
+                <a:schemeClr val="bg1"/>
+              </a:solidFill>
+              <a:prstDash val="solid"/>
+              <a:headEnd type="none" w="med" len="med"/>
+              <a:tailEnd type="none" w="med" len="med"/>
+            </a:ln>
+            <a:effectLst/>
+          </p:spPr>
+          <p:style>
+            <a:lnRef idx="1">
+              <a:schemeClr val="accent5"/>
+            </a:lnRef>
+            <a:fillRef idx="3">
+              <a:schemeClr val="accent5"/>
+            </a:fillRef>
+            <a:effectRef idx="2">
+              <a:schemeClr val="accent5"/>
+            </a:effectRef>
+            <a:fontRef idx="minor">
+              <a:schemeClr val="lt1"/>
+            </a:fontRef>
+          </p:style>
+          <p:txBody>
+            <a:bodyPr vert="horz" wrap="square" lIns="0" tIns="0" rIns="0" bIns="0" numCol="1" rtlCol="0" anchor="ctr" anchorCtr="0" compatLnSpc="1">
+              <a:prstTxWarp prst="textNoShape">
+                <a:avLst/>
+              </a:prstTxWarp>
+              <a:noAutofit/>
+            </a:bodyPr>
+            <a:lstStyle/>
+            <a:p>
+              <a:pPr algn="ctr" defTabSz="1219170" fontAlgn="base">
+                <a:lnSpc>
+                  <a:spcPct val="90000"/>
+                </a:lnSpc>
+                <a:spcBef>
+                  <a:spcPct val="0"/>
+                </a:spcBef>
+                <a:spcAft>
+                  <a:spcPct val="0"/>
+                </a:spcAft>
+              </a:pPr>
+              <a:r>
+                <a:rPr lang="en-US" sz="1200" dirty="0">
+                  <a:solidFill>
+                    <a:schemeClr val="bg1"/>
+                  </a:solidFill>
+                </a:rPr>
+                <a:t>2</a:t>
+              </a:r>
+              <a:endParaRPr lang="en-US" sz="667" dirty="0">
+                <a:solidFill>
+                  <a:schemeClr val="bg1"/>
+                </a:solidFill>
+              </a:endParaRPr>
+            </a:p>
+          </p:txBody>
+        </p:sp>
+        <p:sp>
+          <p:nvSpPr>
+            <p:cNvPr id="55" name="TextBox 54">
+              <a:extLst>
+                <a:ext uri="{FF2B5EF4-FFF2-40B4-BE49-F238E27FC236}">
+                  <a16:creationId xmlns:a16="http://schemas.microsoft.com/office/drawing/2014/main" id="{203AFDF0-27AD-8741-A3E8-C24F93A06D9B}"/>
+                </a:ext>
+              </a:extLst>
+            </p:cNvPr>
+            <p:cNvSpPr txBox="1"/>
+            <p:nvPr/>
+          </p:nvSpPr>
+          <p:spPr>
+            <a:xfrm>
+              <a:off x="2649712" y="2855073"/>
+              <a:ext cx="1059906" cy="246221"/>
+            </a:xfrm>
+            <a:prstGeom prst="rect">
+              <a:avLst/>
+            </a:prstGeom>
+            <a:noFill/>
+          </p:spPr>
+          <p:txBody>
+            <a:bodyPr wrap="none" rtlCol="0">
+              <a:spAutoFit/>
+            </a:bodyPr>
+            <a:lstStyle/>
+            <a:p>
+              <a:r>
+                <a:rPr lang="en-US" sz="1000" dirty="0" err="1">
+                  <a:solidFill>
+                    <a:schemeClr val="accent1">
+                      <a:lumMod val="25000"/>
+                    </a:schemeClr>
+                  </a:solidFill>
+                </a:rPr>
+                <a:t>orderCommands</a:t>
+              </a:r>
+              <a:endParaRPr lang="en-US" sz="1000" dirty="0">
+                <a:solidFill>
+                  <a:schemeClr val="accent1">
+                    <a:lumMod val="25000"/>
+                  </a:schemeClr>
+                </a:solidFill>
+              </a:endParaRPr>
+            </a:p>
+          </p:txBody>
+        </p:sp>
+      </p:grpSp>
+      <p:grpSp>
+        <p:nvGrpSpPr>
+          <p:cNvPr id="21" name="Group 20">
+            <a:extLst>
+              <a:ext uri="{FF2B5EF4-FFF2-40B4-BE49-F238E27FC236}">
+                <a16:creationId xmlns:a16="http://schemas.microsoft.com/office/drawing/2014/main" id="{E36995D9-55DF-684B-ABF4-DC2720901674}"/>
+              </a:ext>
+            </a:extLst>
+          </p:cNvPr>
+          <p:cNvGrpSpPr/>
+          <p:nvPr/>
+        </p:nvGrpSpPr>
+        <p:grpSpPr>
+          <a:xfrm>
+            <a:off x="5527747" y="733240"/>
+            <a:ext cx="732893" cy="647549"/>
+            <a:chOff x="2943190" y="4391413"/>
+            <a:chExt cx="732893" cy="647549"/>
+          </a:xfrm>
+        </p:grpSpPr>
+        <p:sp>
+          <p:nvSpPr>
+            <p:cNvPr id="63" name="Rounded Rectangle 62">
+              <a:extLst>
+                <a:ext uri="{FF2B5EF4-FFF2-40B4-BE49-F238E27FC236}">
+                  <a16:creationId xmlns:a16="http://schemas.microsoft.com/office/drawing/2014/main" id="{459F526B-9C97-634D-8B54-64EB7125E129}"/>
+                </a:ext>
+              </a:extLst>
+            </p:cNvPr>
+            <p:cNvSpPr/>
+            <p:nvPr/>
+          </p:nvSpPr>
+          <p:spPr bwMode="auto">
+            <a:xfrm>
+              <a:off x="2963940" y="4698127"/>
+              <a:ext cx="146861" cy="340835"/>
+            </a:xfrm>
+            <a:prstGeom prst="roundRect">
+              <a:avLst/>
+            </a:prstGeom>
+            <a:solidFill>
+              <a:schemeClr val="bg2"/>
+            </a:solidFill>
+            <a:ln>
+              <a:solidFill>
+                <a:schemeClr val="bg1"/>
+              </a:solidFill>
+              <a:prstDash val="solid"/>
+              <a:headEnd type="none" w="med" len="med"/>
+              <a:tailEnd type="none" w="med" len="med"/>
+            </a:ln>
+            <a:effectLst/>
+          </p:spPr>
+          <p:style>
+            <a:lnRef idx="1">
+              <a:schemeClr val="accent5"/>
+            </a:lnRef>
+            <a:fillRef idx="3">
+              <a:schemeClr val="accent5"/>
+            </a:fillRef>
+            <a:effectRef idx="2">
+              <a:schemeClr val="accent5"/>
+            </a:effectRef>
+            <a:fontRef idx="minor">
+              <a:schemeClr val="lt1"/>
+            </a:fontRef>
+          </p:style>
+          <p:txBody>
+            <a:bodyPr vert="horz" wrap="square" lIns="0" tIns="0" rIns="0" bIns="0" numCol="1" rtlCol="0" anchor="ctr" anchorCtr="0" compatLnSpc="1">
+              <a:prstTxWarp prst="textNoShape">
+                <a:avLst/>
+              </a:prstTxWarp>
+              <a:noAutofit/>
+            </a:bodyPr>
+            <a:lstStyle/>
+            <a:p>
+              <a:pPr algn="ctr" defTabSz="1219170" fontAlgn="base">
+                <a:lnSpc>
+                  <a:spcPct val="90000"/>
+                </a:lnSpc>
+                <a:spcBef>
+                  <a:spcPct val="0"/>
+                </a:spcBef>
+                <a:spcAft>
+                  <a:spcPct val="0"/>
+                </a:spcAft>
+              </a:pPr>
+              <a:r>
+                <a:rPr lang="en-US" sz="1200" dirty="0">
+                  <a:solidFill>
+                    <a:schemeClr val="bg1"/>
+                  </a:solidFill>
+                </a:rPr>
+                <a:t>0</a:t>
+              </a:r>
+              <a:endParaRPr lang="en-US" sz="667" dirty="0">
+                <a:solidFill>
+                  <a:schemeClr val="bg1"/>
+                </a:solidFill>
+              </a:endParaRPr>
+            </a:p>
+          </p:txBody>
+        </p:sp>
+        <p:sp>
+          <p:nvSpPr>
+            <p:cNvPr id="64" name="Rounded Rectangle 63">
+              <a:extLst>
+                <a:ext uri="{FF2B5EF4-FFF2-40B4-BE49-F238E27FC236}">
+                  <a16:creationId xmlns:a16="http://schemas.microsoft.com/office/drawing/2014/main" id="{F82A6D44-ECD0-DD47-B9DD-C4D4CB3AD8EA}"/>
+                </a:ext>
+              </a:extLst>
+            </p:cNvPr>
+            <p:cNvSpPr/>
+            <p:nvPr/>
+          </p:nvSpPr>
+          <p:spPr bwMode="auto">
+            <a:xfrm>
+              <a:off x="3118877" y="4698127"/>
+              <a:ext cx="148586" cy="340835"/>
+            </a:xfrm>
+            <a:prstGeom prst="roundRect">
+              <a:avLst/>
+            </a:prstGeom>
+            <a:solidFill>
+              <a:schemeClr val="bg2"/>
+            </a:solidFill>
+            <a:ln>
+              <a:solidFill>
+                <a:schemeClr val="bg1"/>
+              </a:solidFill>
+              <a:prstDash val="solid"/>
+              <a:headEnd type="none" w="med" len="med"/>
+              <a:tailEnd type="none" w="med" len="med"/>
+            </a:ln>
+            <a:effectLst/>
+          </p:spPr>
+          <p:style>
+            <a:lnRef idx="1">
+              <a:schemeClr val="accent5"/>
+            </a:lnRef>
+            <a:fillRef idx="3">
+              <a:schemeClr val="accent5"/>
+            </a:fillRef>
+            <a:effectRef idx="2">
+              <a:schemeClr val="accent5"/>
+            </a:effectRef>
+            <a:fontRef idx="minor">
+              <a:schemeClr val="lt1"/>
+            </a:fontRef>
+          </p:style>
+          <p:txBody>
+            <a:bodyPr vert="horz" wrap="square" lIns="0" tIns="0" rIns="0" bIns="0" numCol="1" rtlCol="0" anchor="ctr" anchorCtr="0" compatLnSpc="1">
+              <a:prstTxWarp prst="textNoShape">
+                <a:avLst/>
+              </a:prstTxWarp>
+              <a:noAutofit/>
+            </a:bodyPr>
+            <a:lstStyle/>
+            <a:p>
+              <a:pPr algn="ctr" defTabSz="1219170" fontAlgn="base">
+                <a:lnSpc>
+                  <a:spcPct val="90000"/>
+                </a:lnSpc>
+                <a:spcBef>
+                  <a:spcPct val="0"/>
+                </a:spcBef>
+                <a:spcAft>
+                  <a:spcPct val="0"/>
+                </a:spcAft>
+              </a:pPr>
+              <a:r>
+                <a:rPr lang="en-US" sz="1200" dirty="0">
+                  <a:solidFill>
+                    <a:schemeClr val="bg1"/>
+                  </a:solidFill>
+                </a:rPr>
+                <a:t>1</a:t>
+              </a:r>
+              <a:endParaRPr lang="en-US" sz="667" dirty="0">
+                <a:solidFill>
+                  <a:schemeClr val="bg1"/>
+                </a:solidFill>
+              </a:endParaRPr>
+            </a:p>
+          </p:txBody>
+        </p:sp>
+        <p:sp>
+          <p:nvSpPr>
+            <p:cNvPr id="67" name="Rounded Rectangle 66">
+              <a:extLst>
+                <a:ext uri="{FF2B5EF4-FFF2-40B4-BE49-F238E27FC236}">
+                  <a16:creationId xmlns:a16="http://schemas.microsoft.com/office/drawing/2014/main" id="{AB9DB6C5-800F-0448-A1E5-36E45D11DCFB}"/>
+                </a:ext>
+              </a:extLst>
+            </p:cNvPr>
+            <p:cNvSpPr/>
+            <p:nvPr/>
+          </p:nvSpPr>
+          <p:spPr bwMode="auto">
+            <a:xfrm>
+              <a:off x="3260305" y="4698127"/>
+              <a:ext cx="148586" cy="340835"/>
+            </a:xfrm>
+            <a:prstGeom prst="roundRect">
+              <a:avLst/>
+            </a:prstGeom>
+            <a:solidFill>
+              <a:schemeClr val="bg2"/>
+            </a:solidFill>
+            <a:ln>
+              <a:solidFill>
+                <a:schemeClr val="bg1"/>
+              </a:solidFill>
+              <a:prstDash val="solid"/>
+              <a:headEnd type="none" w="med" len="med"/>
+              <a:tailEnd type="none" w="med" len="med"/>
+            </a:ln>
+            <a:effectLst/>
+          </p:spPr>
+          <p:style>
+            <a:lnRef idx="1">
+              <a:schemeClr val="accent5"/>
+            </a:lnRef>
+            <a:fillRef idx="3">
+              <a:schemeClr val="accent5"/>
+            </a:fillRef>
+            <a:effectRef idx="2">
+              <a:schemeClr val="accent5"/>
+            </a:effectRef>
+            <a:fontRef idx="minor">
+              <a:schemeClr val="lt1"/>
+            </a:fontRef>
+          </p:style>
+          <p:txBody>
+            <a:bodyPr vert="horz" wrap="square" lIns="0" tIns="0" rIns="0" bIns="0" numCol="1" rtlCol="0" anchor="ctr" anchorCtr="0" compatLnSpc="1">
+              <a:prstTxWarp prst="textNoShape">
+                <a:avLst/>
+              </a:prstTxWarp>
+              <a:noAutofit/>
+            </a:bodyPr>
+            <a:lstStyle/>
+            <a:p>
+              <a:pPr algn="ctr" defTabSz="1219170" fontAlgn="base">
+                <a:lnSpc>
+                  <a:spcPct val="90000"/>
+                </a:lnSpc>
+                <a:spcBef>
+                  <a:spcPct val="0"/>
+                </a:spcBef>
+                <a:spcAft>
+                  <a:spcPct val="0"/>
+                </a:spcAft>
+              </a:pPr>
+              <a:r>
+                <a:rPr lang="en-US" sz="1200" dirty="0">
+                  <a:solidFill>
+                    <a:schemeClr val="bg1"/>
+                  </a:solidFill>
+                </a:rPr>
+                <a:t>2</a:t>
+              </a:r>
+              <a:endParaRPr lang="en-US" sz="667" dirty="0">
+                <a:solidFill>
+                  <a:schemeClr val="bg1"/>
+                </a:solidFill>
+              </a:endParaRPr>
+            </a:p>
+          </p:txBody>
+        </p:sp>
+        <p:sp>
+          <p:nvSpPr>
+            <p:cNvPr id="71" name="TextBox 70">
+              <a:extLst>
+                <a:ext uri="{FF2B5EF4-FFF2-40B4-BE49-F238E27FC236}">
+                  <a16:creationId xmlns:a16="http://schemas.microsoft.com/office/drawing/2014/main" id="{FDB57912-4311-494B-B18F-140683CDF173}"/>
+                </a:ext>
+              </a:extLst>
+            </p:cNvPr>
+            <p:cNvSpPr txBox="1"/>
+            <p:nvPr/>
+          </p:nvSpPr>
+          <p:spPr>
+            <a:xfrm>
+              <a:off x="2943190" y="4391413"/>
+              <a:ext cx="732893" cy="246221"/>
+            </a:xfrm>
+            <a:prstGeom prst="rect">
+              <a:avLst/>
+            </a:prstGeom>
+            <a:noFill/>
+          </p:spPr>
+          <p:txBody>
+            <a:bodyPr wrap="square" rtlCol="0">
+              <a:spAutoFit/>
+            </a:bodyPr>
+            <a:lstStyle/>
+            <a:p>
+              <a:r>
+                <a:rPr lang="en-US" sz="1000" dirty="0">
+                  <a:solidFill>
+                    <a:schemeClr val="accent1">
+                      <a:lumMod val="25000"/>
+                    </a:schemeClr>
+                  </a:solidFill>
+                </a:rPr>
+                <a:t>orders</a:t>
+              </a:r>
+            </a:p>
+          </p:txBody>
+        </p:sp>
+      </p:grpSp>
+      <p:cxnSp>
+        <p:nvCxnSpPr>
+          <p:cNvPr id="72" name="Straight Connector 71">
+            <a:extLst>
+              <a:ext uri="{FF2B5EF4-FFF2-40B4-BE49-F238E27FC236}">
+                <a16:creationId xmlns:a16="http://schemas.microsoft.com/office/drawing/2014/main" id="{4E532F80-2994-BB45-8C88-0174ADC98339}"/>
+              </a:ext>
+            </a:extLst>
+          </p:cNvPr>
+          <p:cNvCxnSpPr>
+            <a:cxnSpLocks/>
+          </p:cNvCxnSpPr>
+          <p:nvPr/>
+        </p:nvCxnSpPr>
+        <p:spPr>
+          <a:xfrm>
+            <a:off x="11247333" y="1352714"/>
+            <a:ext cx="61379" cy="4917534"/>
+          </a:xfrm>
+          <a:prstGeom prst="line">
+            <a:avLst/>
+          </a:prstGeom>
+          <a:ln>
+            <a:solidFill>
+              <a:schemeClr val="accent1"/>
+            </a:solidFill>
+            <a:prstDash val="sysDot"/>
+          </a:ln>
+          <a:effectLst/>
+        </p:spPr>
+        <p:style>
+          <a:lnRef idx="2">
+            <a:schemeClr val="accent1"/>
+          </a:lnRef>
+          <a:fillRef idx="0">
+            <a:schemeClr val="accent1"/>
+          </a:fillRef>
+          <a:effectRef idx="1">
+            <a:schemeClr val="accent1"/>
+          </a:effectRef>
+          <a:fontRef idx="minor">
+            <a:schemeClr val="tx1"/>
+          </a:fontRef>
+        </p:style>
+      </p:cxnSp>
+      <p:cxnSp>
+        <p:nvCxnSpPr>
+          <p:cNvPr id="73" name="Straight Connector 72">
+            <a:extLst>
+              <a:ext uri="{FF2B5EF4-FFF2-40B4-BE49-F238E27FC236}">
+                <a16:creationId xmlns:a16="http://schemas.microsoft.com/office/drawing/2014/main" id="{B713245F-93D0-DC4C-84F6-F481396B3356}"/>
+              </a:ext>
+            </a:extLst>
+          </p:cNvPr>
+          <p:cNvCxnSpPr>
+            <a:cxnSpLocks/>
+          </p:cNvCxnSpPr>
+          <p:nvPr/>
+        </p:nvCxnSpPr>
+        <p:spPr>
+          <a:xfrm>
+            <a:off x="3867056" y="1450362"/>
+            <a:ext cx="67" cy="4839580"/>
+          </a:xfrm>
+          <a:prstGeom prst="line">
+            <a:avLst/>
+          </a:prstGeom>
+          <a:ln>
+            <a:solidFill>
+              <a:schemeClr val="accent1"/>
+            </a:solidFill>
+            <a:prstDash val="solid"/>
+          </a:ln>
+          <a:effectLst/>
+        </p:spPr>
+        <p:style>
+          <a:lnRef idx="2">
+            <a:schemeClr val="accent1"/>
+          </a:lnRef>
+          <a:fillRef idx="0">
+            <a:schemeClr val="accent1"/>
+          </a:fillRef>
+          <a:effectRef idx="1">
+            <a:schemeClr val="accent1"/>
+          </a:effectRef>
+          <a:fontRef idx="minor">
+            <a:schemeClr val="tx1"/>
+          </a:fontRef>
+        </p:style>
+      </p:cxnSp>
+      <p:cxnSp>
+        <p:nvCxnSpPr>
+          <p:cNvPr id="74" name="Straight Connector 73">
+            <a:extLst>
+              <a:ext uri="{FF2B5EF4-FFF2-40B4-BE49-F238E27FC236}">
+                <a16:creationId xmlns:a16="http://schemas.microsoft.com/office/drawing/2014/main" id="{20ED7CC8-E713-A44D-80C6-DACE470ADE31}"/>
+              </a:ext>
+            </a:extLst>
+          </p:cNvPr>
+          <p:cNvCxnSpPr>
+            <a:cxnSpLocks/>
+          </p:cNvCxnSpPr>
+          <p:nvPr/>
+        </p:nvCxnSpPr>
+        <p:spPr>
+          <a:xfrm>
+            <a:off x="4758579" y="1422194"/>
+            <a:ext cx="67" cy="4839580"/>
+          </a:xfrm>
+          <a:prstGeom prst="line">
+            <a:avLst/>
+          </a:prstGeom>
+          <a:ln>
+            <a:solidFill>
+              <a:schemeClr val="accent1"/>
+            </a:solidFill>
+            <a:prstDash val="sysDot"/>
+          </a:ln>
+          <a:effectLst/>
+        </p:spPr>
+        <p:style>
+          <a:lnRef idx="2">
+            <a:schemeClr val="accent1"/>
+          </a:lnRef>
+          <a:fillRef idx="0">
+            <a:schemeClr val="accent1"/>
+          </a:fillRef>
+          <a:effectRef idx="1">
+            <a:schemeClr val="accent1"/>
+          </a:effectRef>
+          <a:fontRef idx="minor">
+            <a:schemeClr val="tx1"/>
+          </a:fontRef>
+        </p:style>
+      </p:cxnSp>
+      <p:cxnSp>
+        <p:nvCxnSpPr>
+          <p:cNvPr id="75" name="Straight Connector 74">
+            <a:extLst>
+              <a:ext uri="{FF2B5EF4-FFF2-40B4-BE49-F238E27FC236}">
+                <a16:creationId xmlns:a16="http://schemas.microsoft.com/office/drawing/2014/main" id="{16697C94-E47B-CC4A-92F4-03CBA7E083C1}"/>
+              </a:ext>
+            </a:extLst>
+          </p:cNvPr>
+          <p:cNvCxnSpPr>
+            <a:cxnSpLocks/>
+          </p:cNvCxnSpPr>
+          <p:nvPr/>
+        </p:nvCxnSpPr>
+        <p:spPr>
+          <a:xfrm>
+            <a:off x="5774048" y="1442165"/>
+            <a:ext cx="67" cy="4839580"/>
+          </a:xfrm>
+          <a:prstGeom prst="line">
+            <a:avLst/>
+          </a:prstGeom>
+          <a:ln>
+            <a:solidFill>
+              <a:schemeClr val="accent1"/>
+            </a:solidFill>
+            <a:prstDash val="sysDot"/>
+          </a:ln>
+          <a:effectLst/>
+        </p:spPr>
+        <p:style>
+          <a:lnRef idx="2">
+            <a:schemeClr val="accent1"/>
+          </a:lnRef>
+          <a:fillRef idx="0">
+            <a:schemeClr val="accent1"/>
+          </a:fillRef>
+          <a:effectRef idx="1">
+            <a:schemeClr val="accent1"/>
+          </a:effectRef>
+          <a:fontRef idx="minor">
+            <a:schemeClr val="tx1"/>
+          </a:fontRef>
+        </p:style>
+      </p:cxnSp>
+      <p:sp>
+        <p:nvSpPr>
+          <p:cNvPr id="19" name="Rectangle 18">
+            <a:extLst>
+              <a:ext uri="{FF2B5EF4-FFF2-40B4-BE49-F238E27FC236}">
+                <a16:creationId xmlns:a16="http://schemas.microsoft.com/office/drawing/2014/main" id="{E3A14DE4-1686-F643-BC1D-E589E0FAA372}"/>
+              </a:ext>
+            </a:extLst>
+          </p:cNvPr>
+          <p:cNvSpPr/>
+          <p:nvPr/>
+        </p:nvSpPr>
+        <p:spPr>
+          <a:xfrm>
+            <a:off x="1536984" y="3747551"/>
+            <a:ext cx="1356462" cy="230832"/>
+          </a:xfrm>
+          <a:prstGeom prst="rect">
+            <a:avLst/>
+          </a:prstGeom>
+        </p:spPr>
+        <p:txBody>
+          <a:bodyPr wrap="none">
+            <a:spAutoFit/>
+          </a:bodyPr>
+          <a:lstStyle/>
+          <a:p>
+            <a:pPr algn="ctr"/>
+            <a:r>
+              <a:rPr lang="en-US" sz="900" dirty="0">
+                <a:solidFill>
+                  <a:schemeClr val="tx1">
+                    <a:lumMod val="50000"/>
+                  </a:schemeClr>
+                </a:solidFill>
+                <a:latin typeface="Menlo" panose="020B0609030804020204" pitchFamily="49" charset="0"/>
+              </a:rPr>
+              <a:t>Disable BPM (API)</a:t>
+            </a:r>
+            <a:endParaRPr lang="en-US" sz="900" b="0" dirty="0">
+              <a:solidFill>
+                <a:schemeClr val="tx1">
+                  <a:lumMod val="50000"/>
+                </a:schemeClr>
+              </a:solidFill>
+              <a:effectLst/>
+              <a:latin typeface="Menlo" panose="020B0609030804020204" pitchFamily="49" charset="0"/>
+            </a:endParaRPr>
+          </a:p>
+        </p:txBody>
+      </p:sp>
+      <p:cxnSp>
+        <p:nvCxnSpPr>
+          <p:cNvPr id="37" name="Straight Arrow Connector 36">
+            <a:extLst>
+              <a:ext uri="{FF2B5EF4-FFF2-40B4-BE49-F238E27FC236}">
+                <a16:creationId xmlns:a16="http://schemas.microsoft.com/office/drawing/2014/main" id="{232E98DE-D6C7-4E4D-A417-F51E37B94235}"/>
+              </a:ext>
+            </a:extLst>
+          </p:cNvPr>
+          <p:cNvCxnSpPr>
+            <a:cxnSpLocks/>
+          </p:cNvCxnSpPr>
+          <p:nvPr/>
+        </p:nvCxnSpPr>
+        <p:spPr>
+          <a:xfrm flipV="1">
+            <a:off x="1280097" y="4116883"/>
+            <a:ext cx="8759549" cy="13494"/>
+          </a:xfrm>
+          <a:prstGeom prst="straightConnector1">
+            <a:avLst/>
+          </a:prstGeom>
+          <a:ln>
+            <a:tailEnd type="triangle"/>
+          </a:ln>
+        </p:spPr>
+        <p:style>
+          <a:lnRef idx="1">
+            <a:schemeClr val="accent1"/>
+          </a:lnRef>
+          <a:fillRef idx="0">
+            <a:schemeClr val="accent1"/>
+          </a:fillRef>
+          <a:effectRef idx="0">
+            <a:schemeClr val="accent1"/>
+          </a:effectRef>
+          <a:fontRef idx="minor">
+            <a:schemeClr val="tx1"/>
+          </a:fontRef>
+        </p:style>
+      </p:cxnSp>
+      <p:sp>
+        <p:nvSpPr>
+          <p:cNvPr id="79" name="Rectangle 78">
+            <a:extLst>
+              <a:ext uri="{FF2B5EF4-FFF2-40B4-BE49-F238E27FC236}">
+                <a16:creationId xmlns:a16="http://schemas.microsoft.com/office/drawing/2014/main" id="{41ED11A4-B225-4C4B-AF38-F248234EE8F2}"/>
+              </a:ext>
+            </a:extLst>
+          </p:cNvPr>
+          <p:cNvSpPr/>
+          <p:nvPr/>
+        </p:nvSpPr>
+        <p:spPr>
+          <a:xfrm>
+            <a:off x="1742319" y="1967698"/>
+            <a:ext cx="1563249" cy="230832"/>
+          </a:xfrm>
+          <a:prstGeom prst="rect">
+            <a:avLst/>
+          </a:prstGeom>
+        </p:spPr>
+        <p:txBody>
+          <a:bodyPr wrap="none">
+            <a:spAutoFit/>
+          </a:bodyPr>
+          <a:lstStyle/>
+          <a:p>
+            <a:pPr algn="ctr"/>
+            <a:r>
+              <a:rPr lang="en-US" sz="900" b="0" dirty="0">
+                <a:solidFill>
+                  <a:schemeClr val="tx1">
+                    <a:lumMod val="50000"/>
+                  </a:schemeClr>
+                </a:solidFill>
+                <a:effectLst/>
+                <a:latin typeface="Menlo" panose="020B0609030804020204" pitchFamily="49" charset="0"/>
+              </a:rPr>
+              <a:t>Get BPM status (API)</a:t>
+            </a:r>
+          </a:p>
+        </p:txBody>
+      </p:sp>
+      <p:cxnSp>
+        <p:nvCxnSpPr>
+          <p:cNvPr id="93" name="Straight Arrow Connector 92">
+            <a:extLst>
+              <a:ext uri="{FF2B5EF4-FFF2-40B4-BE49-F238E27FC236}">
+                <a16:creationId xmlns:a16="http://schemas.microsoft.com/office/drawing/2014/main" id="{CA1C6312-F6B7-5340-9ABC-F8AFE8C86570}"/>
+              </a:ext>
+            </a:extLst>
+          </p:cNvPr>
+          <p:cNvCxnSpPr>
+            <a:cxnSpLocks/>
+          </p:cNvCxnSpPr>
+          <p:nvPr/>
+        </p:nvCxnSpPr>
+        <p:spPr>
+          <a:xfrm>
+            <a:off x="1262834" y="2301071"/>
+            <a:ext cx="8743722" cy="0"/>
+          </a:xfrm>
+          <a:prstGeom prst="straightConnector1">
+            <a:avLst/>
+          </a:prstGeom>
+          <a:ln>
+            <a:headEnd type="triangle"/>
+            <a:tailEnd type="none"/>
+          </a:ln>
+        </p:spPr>
+        <p:style>
+          <a:lnRef idx="1">
+            <a:schemeClr val="accent1"/>
+          </a:lnRef>
+          <a:fillRef idx="0">
+            <a:schemeClr val="accent1"/>
+          </a:fillRef>
+          <a:effectRef idx="0">
+            <a:schemeClr val="accent1"/>
+          </a:effectRef>
+          <a:fontRef idx="minor">
+            <a:schemeClr val="tx1"/>
+          </a:fontRef>
+        </p:style>
+      </p:cxnSp>
+      <p:sp>
+        <p:nvSpPr>
+          <p:cNvPr id="62" name="Rectangle 61">
+            <a:extLst>
+              <a:ext uri="{FF2B5EF4-FFF2-40B4-BE49-F238E27FC236}">
+                <a16:creationId xmlns:a16="http://schemas.microsoft.com/office/drawing/2014/main" id="{43104729-30AB-2A4A-AF04-5C650C91451E}"/>
+              </a:ext>
+            </a:extLst>
+          </p:cNvPr>
+          <p:cNvSpPr/>
+          <p:nvPr/>
+        </p:nvSpPr>
+        <p:spPr>
+          <a:xfrm>
+            <a:off x="1453619" y="2758172"/>
+            <a:ext cx="2114682" cy="230832"/>
+          </a:xfrm>
+          <a:prstGeom prst="rect">
+            <a:avLst/>
+          </a:prstGeom>
+        </p:spPr>
+        <p:txBody>
+          <a:bodyPr wrap="none">
+            <a:spAutoFit/>
+          </a:bodyPr>
+          <a:lstStyle/>
+          <a:p>
+            <a:pPr algn="ctr"/>
+            <a:r>
+              <a:rPr lang="en-US" sz="900" b="0" dirty="0">
+                <a:solidFill>
+                  <a:schemeClr val="tx1">
+                    <a:lumMod val="50000"/>
+                  </a:schemeClr>
+                </a:solidFill>
+                <a:effectLst/>
+                <a:latin typeface="Menlo" panose="020B0609030804020204" pitchFamily="49" charset="0"/>
+              </a:rPr>
+              <a:t>Verify BPM status is enabled</a:t>
+            </a:r>
+          </a:p>
+        </p:txBody>
+      </p:sp>
+      <p:sp>
+        <p:nvSpPr>
+          <p:cNvPr id="45" name="Rounded Rectangle 44">
+            <a:extLst>
+              <a:ext uri="{FF2B5EF4-FFF2-40B4-BE49-F238E27FC236}">
+                <a16:creationId xmlns:a16="http://schemas.microsoft.com/office/drawing/2014/main" id="{11120156-81C3-3A43-9203-249F234F16EE}"/>
+              </a:ext>
+            </a:extLst>
+          </p:cNvPr>
+          <p:cNvSpPr/>
+          <p:nvPr/>
+        </p:nvSpPr>
+        <p:spPr>
+          <a:xfrm>
+            <a:off x="1195842" y="2570459"/>
+            <a:ext cx="173522" cy="605750"/>
+          </a:xfrm>
+          <a:prstGeom prst="roundRect">
+            <a:avLst/>
+          </a:prstGeom>
+          <a:solidFill>
+            <a:schemeClr val="accent4">
+              <a:lumMod val="20000"/>
+              <a:lumOff val="80000"/>
+            </a:schemeClr>
+          </a:solidFill>
+        </p:spPr>
+        <p:style>
+          <a:lnRef idx="2">
+            <a:schemeClr val="accent1">
+              <a:shade val="50000"/>
+            </a:schemeClr>
+          </a:lnRef>
+          <a:fillRef idx="1">
+            <a:schemeClr val="accent1"/>
+          </a:fillRef>
+          <a:effectRef idx="0">
+            <a:schemeClr val="accent1"/>
+          </a:effectRef>
+          <a:fontRef idx="minor">
+            <a:schemeClr val="lt1"/>
+          </a:fontRef>
+        </p:style>
+        <p:txBody>
+          <a:bodyPr rtlCol="0" anchor="ctr"/>
+          <a:lstStyle/>
+          <a:p>
+            <a:pPr algn="ctr"/>
+            <a:endParaRPr lang="en-US"/>
+          </a:p>
+        </p:txBody>
+      </p:sp>
+      <p:sp>
+        <p:nvSpPr>
+          <p:cNvPr id="51" name="Rectangle 50">
+            <a:extLst>
+              <a:ext uri="{FF2B5EF4-FFF2-40B4-BE49-F238E27FC236}">
+                <a16:creationId xmlns:a16="http://schemas.microsoft.com/office/drawing/2014/main" id="{1F94DF2E-FA7A-4141-B1C9-2D13F1ACE097}"/>
+              </a:ext>
+            </a:extLst>
+          </p:cNvPr>
+          <p:cNvSpPr/>
+          <p:nvPr/>
+        </p:nvSpPr>
+        <p:spPr>
+          <a:xfrm>
+            <a:off x="1419156" y="4850951"/>
+            <a:ext cx="2183611" cy="230832"/>
+          </a:xfrm>
+          <a:prstGeom prst="rect">
+            <a:avLst/>
+          </a:prstGeom>
+        </p:spPr>
+        <p:txBody>
+          <a:bodyPr wrap="none">
+            <a:spAutoFit/>
+          </a:bodyPr>
+          <a:lstStyle/>
+          <a:p>
+            <a:pPr algn="ctr"/>
+            <a:r>
+              <a:rPr lang="en-US" sz="900" b="0" dirty="0">
+                <a:solidFill>
+                  <a:schemeClr val="tx1">
+                    <a:lumMod val="50000"/>
+                  </a:schemeClr>
+                </a:solidFill>
+                <a:effectLst/>
+                <a:latin typeface="Menlo" panose="020B0609030804020204" pitchFamily="49" charset="0"/>
+              </a:rPr>
+              <a:t>Verify BPM status is disabled</a:t>
+            </a:r>
+          </a:p>
+        </p:txBody>
+      </p:sp>
+      <p:sp>
+        <p:nvSpPr>
+          <p:cNvPr id="53" name="Rounded Rectangle 52">
+            <a:extLst>
+              <a:ext uri="{FF2B5EF4-FFF2-40B4-BE49-F238E27FC236}">
+                <a16:creationId xmlns:a16="http://schemas.microsoft.com/office/drawing/2014/main" id="{29F8E24A-A85A-FB40-A029-1BCCD21F32D9}"/>
+              </a:ext>
+            </a:extLst>
+          </p:cNvPr>
+          <p:cNvSpPr/>
+          <p:nvPr/>
+        </p:nvSpPr>
+        <p:spPr>
+          <a:xfrm>
+            <a:off x="1195842" y="4663238"/>
+            <a:ext cx="173522" cy="605750"/>
+          </a:xfrm>
+          <a:prstGeom prst="roundRect">
+            <a:avLst/>
+          </a:prstGeom>
+          <a:solidFill>
+            <a:schemeClr val="accent4">
+              <a:lumMod val="20000"/>
+              <a:lumOff val="80000"/>
+            </a:schemeClr>
+          </a:solidFill>
+        </p:spPr>
+        <p:style>
+          <a:lnRef idx="2">
+            <a:schemeClr val="accent1">
+              <a:shade val="50000"/>
+            </a:schemeClr>
+          </a:lnRef>
+          <a:fillRef idx="1">
+            <a:schemeClr val="accent1"/>
+          </a:fillRef>
+          <a:effectRef idx="0">
+            <a:schemeClr val="accent1"/>
+          </a:effectRef>
+          <a:fontRef idx="minor">
+            <a:schemeClr val="lt1"/>
+          </a:fontRef>
+        </p:style>
+        <p:txBody>
+          <a:bodyPr rtlCol="0" anchor="ctr"/>
+          <a:lstStyle/>
+          <a:p>
+            <a:pPr algn="ctr"/>
+            <a:endParaRPr lang="en-US"/>
+          </a:p>
+        </p:txBody>
+      </p:sp>
+    </p:spTree>
+    <p:extLst>
+      <p:ext uri="{BB962C8B-B14F-4D97-AF65-F5344CB8AC3E}">
+        <p14:creationId xmlns:p14="http://schemas.microsoft.com/office/powerpoint/2010/main" val="3943330459"/>
+      </p:ext>
+    </p:extLst>
+  </p:cSld>
+  <p:clrMapOvr>
+    <a:masterClrMapping/>
+  </p:clrMapOvr>
+</p:sld>
+</file>
+
+<file path=ppt/slides/slide3.xml><?xml version="1.0" encoding="utf-8"?>
 <p:sld xmlns:a="http://schemas.openxmlformats.org/drawingml/2006/main" xmlns:r="http://schemas.openxmlformats.org/officeDocument/2006/relationships" xmlns:p="http://schemas.openxmlformats.org/presentationml/2006/main">
   <p:cSld>
     <p:spTree>
@@ -7363,7 +11614,7 @@
     </p:spTree>
     <p:extLst>
       <p:ext uri="{BB962C8B-B14F-4D97-AF65-F5344CB8AC3E}">
-        <p14:creationId xmlns:p14="http://schemas.microsoft.com/office/powerpoint/2010/main" val="3943330459"/>
+        <p14:creationId xmlns:p14="http://schemas.microsoft.com/office/powerpoint/2010/main" val="1491080190"/>
       </p:ext>
     </p:extLst>
   </p:cSld>
@@ -7373,7 +11624,7 @@
 </p:sld>
 </file>
 
-<file path=ppt/slides/slide3.xml><?xml version="1.0" encoding="utf-8"?>
+<file path=ppt/slides/slide4.xml><?xml version="1.0" encoding="utf-8"?>
 <p:sld xmlns:a="http://schemas.openxmlformats.org/drawingml/2006/main" xmlns:r="http://schemas.openxmlformats.org/officeDocument/2006/relationships" xmlns:p="http://schemas.openxmlformats.org/presentationml/2006/main">
   <p:cSld>
     <p:spTree>
@@ -9529,7 +13780,7 @@
 </p:sld>
 </file>
 
-<file path=ppt/slides/slide4.xml><?xml version="1.0" encoding="utf-8"?>
+<file path=ppt/slides/slide5.xml><?xml version="1.0" encoding="utf-8"?>
 <p:sld xmlns:a="http://schemas.openxmlformats.org/drawingml/2006/main" xmlns:r="http://schemas.openxmlformats.org/officeDocument/2006/relationships" xmlns:p="http://schemas.openxmlformats.org/presentationml/2006/main">
   <p:cSld>
     <p:spTree>
@@ -12970,7 +17221,7 @@
 </p:sld>
 </file>
 
-<file path=ppt/slides/slide5.xml><?xml version="1.0" encoding="utf-8"?>
+<file path=ppt/slides/slide6.xml><?xml version="1.0" encoding="utf-8"?>
 <p:sld xmlns:a="http://schemas.openxmlformats.org/drawingml/2006/main" xmlns:r="http://schemas.openxmlformats.org/officeDocument/2006/relationships" xmlns:p="http://schemas.openxmlformats.org/presentationml/2006/main">
   <p:cSld>
     <p:spTree>
@@ -15020,7 +19271,7 @@
 </p:sld>
 </file>
 
-<file path=ppt/slides/slide6.xml><?xml version="1.0" encoding="utf-8"?>
+<file path=ppt/slides/slide7.xml><?xml version="1.0" encoding="utf-8"?>
 <p:sld xmlns:a="http://schemas.openxmlformats.org/drawingml/2006/main" xmlns:r="http://schemas.openxmlformats.org/officeDocument/2006/relationships" xmlns:p="http://schemas.openxmlformats.org/presentationml/2006/main">
   <p:cSld>
     <p:spTree>
@@ -17176,7 +21427,7 @@
 </p:sld>
 </file>
 
-<file path=ppt/slides/slide7.xml><?xml version="1.0" encoding="utf-8"?>
+<file path=ppt/slides/slide8.xml><?xml version="1.0" encoding="utf-8"?>
 <p:sld xmlns:a="http://schemas.openxmlformats.org/drawingml/2006/main" xmlns:r="http://schemas.openxmlformats.org/officeDocument/2006/relationships" xmlns:p="http://schemas.openxmlformats.org/presentationml/2006/main">
   <p:cSld>
     <p:spTree>
@@ -19226,7 +23477,7 @@
 </p:sld>
 </file>
 
-<file path=ppt/slides/slide8.xml><?xml version="1.0" encoding="utf-8"?>
+<file path=ppt/slides/slide9.xml><?xml version="1.0" encoding="utf-8"?>
 <p:sld xmlns:a="http://schemas.openxmlformats.org/drawingml/2006/main" xmlns:r="http://schemas.openxmlformats.org/officeDocument/2006/relationships" xmlns:p="http://schemas.openxmlformats.org/presentationml/2006/main">
   <p:cSld>
     <p:spTree>

</xml_diff>